<commit_message>
Kleine wijzigingen presentatie en herstel foutje hands-on
</commit_message>
<xml_diff>
--- a/Elasticsearch.pptx
+++ b/Elasticsearch.pptx
@@ -5,7 +5,7 @@
     <p:sldMasterId id="2147483672" r:id="rId4"/>
   </p:sldMasterIdLst>
   <p:notesMasterIdLst>
-    <p:notesMasterId r:id="rId49"/>
+    <p:notesMasterId r:id="rId48"/>
   </p:notesMasterIdLst>
   <p:sldIdLst>
     <p:sldId id="295" r:id="rId5"/>
@@ -30,28 +30,27 @@
     <p:sldId id="329" r:id="rId24"/>
     <p:sldId id="330" r:id="rId25"/>
     <p:sldId id="331" r:id="rId26"/>
-    <p:sldId id="332" r:id="rId27"/>
-    <p:sldId id="260" r:id="rId28"/>
-    <p:sldId id="296" r:id="rId29"/>
-    <p:sldId id="297" r:id="rId30"/>
-    <p:sldId id="298" r:id="rId31"/>
-    <p:sldId id="299" r:id="rId32"/>
-    <p:sldId id="300" r:id="rId33"/>
-    <p:sldId id="301" r:id="rId34"/>
-    <p:sldId id="302" r:id="rId35"/>
-    <p:sldId id="303" r:id="rId36"/>
-    <p:sldId id="305" r:id="rId37"/>
-    <p:sldId id="304" r:id="rId38"/>
-    <p:sldId id="306" r:id="rId39"/>
-    <p:sldId id="307" r:id="rId40"/>
-    <p:sldId id="308" r:id="rId41"/>
-    <p:sldId id="309" r:id="rId42"/>
-    <p:sldId id="310" r:id="rId43"/>
-    <p:sldId id="311" r:id="rId44"/>
-    <p:sldId id="312" r:id="rId45"/>
-    <p:sldId id="313" r:id="rId46"/>
-    <p:sldId id="278" r:id="rId47"/>
-    <p:sldId id="280" r:id="rId48"/>
+    <p:sldId id="260" r:id="rId27"/>
+    <p:sldId id="296" r:id="rId28"/>
+    <p:sldId id="297" r:id="rId29"/>
+    <p:sldId id="298" r:id="rId30"/>
+    <p:sldId id="299" r:id="rId31"/>
+    <p:sldId id="300" r:id="rId32"/>
+    <p:sldId id="301" r:id="rId33"/>
+    <p:sldId id="302" r:id="rId34"/>
+    <p:sldId id="303" r:id="rId35"/>
+    <p:sldId id="305" r:id="rId36"/>
+    <p:sldId id="304" r:id="rId37"/>
+    <p:sldId id="306" r:id="rId38"/>
+    <p:sldId id="307" r:id="rId39"/>
+    <p:sldId id="308" r:id="rId40"/>
+    <p:sldId id="309" r:id="rId41"/>
+    <p:sldId id="310" r:id="rId42"/>
+    <p:sldId id="311" r:id="rId43"/>
+    <p:sldId id="312" r:id="rId44"/>
+    <p:sldId id="313" r:id="rId45"/>
+    <p:sldId id="278" r:id="rId46"/>
+    <p:sldId id="280" r:id="rId47"/>
   </p:sldIdLst>
   <p:sldSz cx="9144000" cy="5143500" type="screen16x9"/>
   <p:notesSz cx="6858000" cy="9144000"/>
@@ -10141,17 +10140,6 @@
             </a:pPr>
             <a:r>
               <a:rPr lang="en-GB" dirty="0"/>
-              <a:t>Advantages and disadvantages</a:t>
-            </a:r>
-          </a:p>
-          <a:p>
-            <a:pPr>
-              <a:spcAft>
-                <a:spcPts val="600"/>
-              </a:spcAft>
-            </a:pPr>
-            <a:r>
-              <a:rPr lang="en-GB" dirty="0"/>
               <a:t>Cluster</a:t>
             </a:r>
           </a:p>
@@ -10253,7 +10241,7 @@
           <a:p>
             <a:r>
               <a:rPr lang="en-US" dirty="0"/>
-              <a:t>Presentation</a:t>
+              <a:t>Presentation (16:30 – 17:30)</a:t>
             </a:r>
           </a:p>
         </p:txBody>
@@ -10285,12 +10273,8 @@
           <a:lstStyle/>
           <a:p>
             <a:r>
-              <a:rPr lang="en-US"/>
-              <a:t>Cluster info and </a:t>
-            </a:r>
-            <a:r>
               <a:rPr lang="en-US" dirty="0"/>
-              <a:t>Indexing</a:t>
+              <a:t>Cluster info and Indexing</a:t>
             </a:r>
           </a:p>
           <a:p>
@@ -10302,13 +10286,16 @@
           <a:p>
             <a:r>
               <a:rPr lang="en-US" dirty="0"/>
-              <a:t>Connecting Node.js to </a:t>
+              <a:t>Connecting to </a:t>
             </a:r>
             <a:r>
               <a:rPr lang="en-US" dirty="0" err="1"/>
               <a:t>ElasticSearch</a:t>
             </a:r>
-            <a:endParaRPr lang="en-US" dirty="0"/>
+            <a:r>
+              <a:rPr lang="en-US" dirty="0"/>
+              <a:t> with Node.js</a:t>
+            </a:r>
           </a:p>
           <a:p>
             <a:r>
@@ -10354,7 +10341,7 @@
           <a:p>
             <a:r>
               <a:rPr lang="en-GB" dirty="0"/>
-              <a:t>Hands-on</a:t>
+              <a:t>Hands-on (19:00 – 20:00)</a:t>
             </a:r>
             <a:endParaRPr lang="en-NL" dirty="0"/>
           </a:p>
@@ -11289,13 +11276,7 @@
       </p:grpSpPr>
       <p:sp>
         <p:nvSpPr>
-          <p:cNvPr id="2" name="Title 1">
-            <a:extLst>
-              <a:ext uri="{FF2B5EF4-FFF2-40B4-BE49-F238E27FC236}">
-                <a16:creationId xmlns:a16="http://schemas.microsoft.com/office/drawing/2014/main" id="{B2539C2F-9CB2-4004-9813-5486C4C02F36}"/>
-              </a:ext>
-            </a:extLst>
-          </p:cNvPr>
+          <p:cNvPr id="6" name="Title 5"/>
           <p:cNvSpPr>
             <a:spLocks noGrp="1"/>
           </p:cNvSpPr>
@@ -11308,19 +11289,16 @@
           <a:bodyPr/>
           <a:lstStyle/>
           <a:p>
-            <a:endParaRPr lang="en-NL"/>
-          </a:p>
-        </p:txBody>
-      </p:sp>
-      <p:sp>
-        <p:nvSpPr>
-          <p:cNvPr id="3" name="Content Placeholder 2">
-            <a:extLst>
-              <a:ext uri="{FF2B5EF4-FFF2-40B4-BE49-F238E27FC236}">
-                <a16:creationId xmlns:a16="http://schemas.microsoft.com/office/drawing/2014/main" id="{11B07F90-0113-4617-9F24-C3492B350E28}"/>
-              </a:ext>
-            </a:extLst>
-          </p:cNvPr>
+            <a:r>
+              <a:rPr lang="nl-NL" dirty="0"/>
+              <a:t>Queries </a:t>
+            </a:r>
+          </a:p>
+        </p:txBody>
+      </p:sp>
+      <p:sp>
+        <p:nvSpPr>
+          <p:cNvPr id="7" name="Content Placeholder 6"/>
           <p:cNvSpPr>
             <a:spLocks noGrp="1"/>
           </p:cNvSpPr>
@@ -11333,19 +11311,80 @@
           <a:bodyPr/>
           <a:lstStyle/>
           <a:p>
-            <a:endParaRPr lang="en-NL"/>
-          </a:p>
-        </p:txBody>
-      </p:sp>
-      <p:sp>
-        <p:nvSpPr>
-          <p:cNvPr id="4" name="Footer Placeholder 3">
-            <a:extLst>
-              <a:ext uri="{FF2B5EF4-FFF2-40B4-BE49-F238E27FC236}">
-                <a16:creationId xmlns:a16="http://schemas.microsoft.com/office/drawing/2014/main" id="{4736938F-5FBA-4DCB-ACCB-4E628EC01805}"/>
-              </a:ext>
-            </a:extLst>
-          </p:cNvPr>
+            <a:r>
+              <a:rPr lang="nl-NL" dirty="0"/>
+              <a:t>URL-based or JSON-based requests on the _search REST endpoint</a:t>
+            </a:r>
+          </a:p>
+          <a:p>
+            <a:r>
+              <a:rPr lang="nl-NL" dirty="0"/>
+              <a:t>Search whole cluster or specify index (or type) in the URL</a:t>
+            </a:r>
+          </a:p>
+          <a:p>
+            <a:endParaRPr lang="nl-NL" dirty="0"/>
+          </a:p>
+          <a:p>
+            <a:r>
+              <a:rPr lang="nl-NL" dirty="0"/>
+              <a:t>Common components of request:</a:t>
+            </a:r>
+          </a:p>
+          <a:p>
+            <a:pPr lvl="1"/>
+            <a:r>
+              <a:rPr lang="nl-NL" sz="1400" dirty="0"/>
+              <a:t>query 	- default all</a:t>
+            </a:r>
+          </a:p>
+          <a:p>
+            <a:pPr lvl="1"/>
+            <a:r>
+              <a:rPr lang="nl-NL" sz="1400" dirty="0"/>
+              <a:t>size 	- default 10 </a:t>
+            </a:r>
+          </a:p>
+          <a:p>
+            <a:pPr lvl="1"/>
+            <a:r>
+              <a:rPr lang="nl-NL" sz="1400" dirty="0"/>
+              <a:t>from 	- default 0</a:t>
+            </a:r>
+          </a:p>
+          <a:p>
+            <a:pPr lvl="1"/>
+            <a:r>
+              <a:rPr lang="nl-NL" sz="1400" dirty="0"/>
+              <a:t>_source 	- default all</a:t>
+            </a:r>
+          </a:p>
+          <a:p>
+            <a:pPr lvl="2"/>
+            <a:r>
+              <a:rPr lang="nl-NL" sz="1400" dirty="0"/>
+              <a:t>Specify which fields of the document to return</a:t>
+            </a:r>
+          </a:p>
+          <a:p>
+            <a:pPr lvl="1"/>
+            <a:r>
+              <a:rPr lang="nl-NL" sz="1400" dirty="0"/>
+              <a:t>sort 	- default on score</a:t>
+            </a:r>
+          </a:p>
+          <a:p>
+            <a:pPr lvl="2"/>
+            <a:r>
+              <a:rPr lang="nl-NL" sz="1400" dirty="0"/>
+              <a:t>No score is calculated when score is not included in the sort</a:t>
+            </a:r>
+          </a:p>
+        </p:txBody>
+      </p:sp>
+      <p:sp>
+        <p:nvSpPr>
+          <p:cNvPr id="4" name="Footer Placeholder 3"/>
           <p:cNvSpPr>
             <a:spLocks noGrp="1"/>
           </p:cNvSpPr>
@@ -11359,7 +11398,7 @@
           <a:lstStyle/>
           <a:p>
             <a:r>
-              <a:rPr lang="nl-NL"/>
+              <a:rPr lang="nl-NL" dirty="0"/>
               <a:t>elasticsearch</a:t>
             </a:r>
           </a:p>
@@ -11367,13 +11406,7 @@
       </p:sp>
       <p:sp>
         <p:nvSpPr>
-          <p:cNvPr id="5" name="Slide Number Placeholder 4">
-            <a:extLst>
-              <a:ext uri="{FF2B5EF4-FFF2-40B4-BE49-F238E27FC236}">
-                <a16:creationId xmlns:a16="http://schemas.microsoft.com/office/drawing/2014/main" id="{8AEF4120-5669-4186-A953-A5327753EF64}"/>
-              </a:ext>
-            </a:extLst>
-          </p:cNvPr>
+          <p:cNvPr id="5" name="Slide Number Placeholder 4"/>
           <p:cNvSpPr>
             <a:spLocks noGrp="1"/>
           </p:cNvSpPr>
@@ -11394,35 +11427,10 @@
           </a:p>
         </p:txBody>
       </p:sp>
-      <p:sp>
-        <p:nvSpPr>
-          <p:cNvPr id="6" name="Text Placeholder 5">
-            <a:extLst>
-              <a:ext uri="{FF2B5EF4-FFF2-40B4-BE49-F238E27FC236}">
-                <a16:creationId xmlns:a16="http://schemas.microsoft.com/office/drawing/2014/main" id="{F07795BB-2B65-43B2-98DF-602273C53532}"/>
-              </a:ext>
-            </a:extLst>
-          </p:cNvPr>
-          <p:cNvSpPr>
-            <a:spLocks noGrp="1"/>
-          </p:cNvSpPr>
-          <p:nvPr>
-            <p:ph type="body" idx="13"/>
-          </p:nvPr>
-        </p:nvSpPr>
-        <p:spPr/>
-        <p:txBody>
-          <a:bodyPr/>
-          <a:lstStyle/>
-          <a:p>
-            <a:endParaRPr lang="en-NL"/>
-          </a:p>
-        </p:txBody>
-      </p:sp>
     </p:spTree>
     <p:extLst>
       <p:ext uri="{BB962C8B-B14F-4D97-AF65-F5344CB8AC3E}">
-        <p14:creationId xmlns:p14="http://schemas.microsoft.com/office/powerpoint/2010/main" val="688021817"/>
+        <p14:creationId xmlns:p14="http://schemas.microsoft.com/office/powerpoint/2010/main" val="683142817"/>
       </p:ext>
     </p:extLst>
   </p:cSld>
@@ -11451,189 +11459,6 @@
       </p:grpSpPr>
       <p:sp>
         <p:nvSpPr>
-          <p:cNvPr id="6" name="Title 5"/>
-          <p:cNvSpPr>
-            <a:spLocks noGrp="1"/>
-          </p:cNvSpPr>
-          <p:nvPr>
-            <p:ph type="title"/>
-          </p:nvPr>
-        </p:nvSpPr>
-        <p:spPr/>
-        <p:txBody>
-          <a:bodyPr/>
-          <a:lstStyle/>
-          <a:p>
-            <a:r>
-              <a:rPr lang="nl-NL" dirty="0"/>
-              <a:t>Queries </a:t>
-            </a:r>
-          </a:p>
-        </p:txBody>
-      </p:sp>
-      <p:sp>
-        <p:nvSpPr>
-          <p:cNvPr id="7" name="Content Placeholder 6"/>
-          <p:cNvSpPr>
-            <a:spLocks noGrp="1"/>
-          </p:cNvSpPr>
-          <p:nvPr>
-            <p:ph idx="1"/>
-          </p:nvPr>
-        </p:nvSpPr>
-        <p:spPr/>
-        <p:txBody>
-          <a:bodyPr/>
-          <a:lstStyle/>
-          <a:p>
-            <a:r>
-              <a:rPr lang="nl-NL" dirty="0"/>
-              <a:t>URL-based or JSON-based requests on the _search REST endpoint</a:t>
-            </a:r>
-          </a:p>
-          <a:p>
-            <a:r>
-              <a:rPr lang="nl-NL" dirty="0"/>
-              <a:t>Search whole cluster or specify index (or type) in the URL</a:t>
-            </a:r>
-          </a:p>
-          <a:p>
-            <a:endParaRPr lang="nl-NL" dirty="0"/>
-          </a:p>
-          <a:p>
-            <a:r>
-              <a:rPr lang="nl-NL" dirty="0"/>
-              <a:t>Common components of request:</a:t>
-            </a:r>
-          </a:p>
-          <a:p>
-            <a:pPr lvl="1"/>
-            <a:r>
-              <a:rPr lang="nl-NL" sz="1400" dirty="0"/>
-              <a:t>query 	- default all</a:t>
-            </a:r>
-          </a:p>
-          <a:p>
-            <a:pPr lvl="1"/>
-            <a:r>
-              <a:rPr lang="nl-NL" sz="1400" dirty="0"/>
-              <a:t>size 	- default 10 </a:t>
-            </a:r>
-          </a:p>
-          <a:p>
-            <a:pPr lvl="1"/>
-            <a:r>
-              <a:rPr lang="nl-NL" sz="1400" dirty="0"/>
-              <a:t>from 	- default 0</a:t>
-            </a:r>
-          </a:p>
-          <a:p>
-            <a:pPr lvl="1"/>
-            <a:r>
-              <a:rPr lang="nl-NL" sz="1400" dirty="0"/>
-              <a:t>_source 	- default all</a:t>
-            </a:r>
-          </a:p>
-          <a:p>
-            <a:pPr lvl="2"/>
-            <a:r>
-              <a:rPr lang="nl-NL" sz="1400" dirty="0"/>
-              <a:t>Specify which fields of the document to return</a:t>
-            </a:r>
-          </a:p>
-          <a:p>
-            <a:pPr lvl="1"/>
-            <a:r>
-              <a:rPr lang="nl-NL" sz="1400" dirty="0"/>
-              <a:t>sort 	- default on score</a:t>
-            </a:r>
-          </a:p>
-          <a:p>
-            <a:pPr lvl="2"/>
-            <a:r>
-              <a:rPr lang="nl-NL" sz="1400" dirty="0"/>
-              <a:t>No score is calculated when score is not included in the sort</a:t>
-            </a:r>
-          </a:p>
-        </p:txBody>
-      </p:sp>
-      <p:sp>
-        <p:nvSpPr>
-          <p:cNvPr id="4" name="Footer Placeholder 3"/>
-          <p:cNvSpPr>
-            <a:spLocks noGrp="1"/>
-          </p:cNvSpPr>
-          <p:nvPr>
-            <p:ph type="ftr" sz="quarter" idx="11"/>
-          </p:nvPr>
-        </p:nvSpPr>
-        <p:spPr/>
-        <p:txBody>
-          <a:bodyPr/>
-          <a:lstStyle/>
-          <a:p>
-            <a:r>
-              <a:rPr lang="nl-NL" dirty="0"/>
-              <a:t>elasticsearch</a:t>
-            </a:r>
-          </a:p>
-        </p:txBody>
-      </p:sp>
-      <p:sp>
-        <p:nvSpPr>
-          <p:cNvPr id="5" name="Slide Number Placeholder 4"/>
-          <p:cNvSpPr>
-            <a:spLocks noGrp="1"/>
-          </p:cNvSpPr>
-          <p:nvPr>
-            <p:ph type="sldNum" sz="quarter" idx="12"/>
-          </p:nvPr>
-        </p:nvSpPr>
-        <p:spPr/>
-        <p:txBody>
-          <a:bodyPr/>
-          <a:lstStyle/>
-          <a:p>
-            <a:fld id="{14F1411D-0280-154F-AEAC-4C20B7AA46B2}" type="slidenum">
-              <a:rPr lang="nl-NL" smtClean="0"/>
-              <a:t>24</a:t>
-            </a:fld>
-            <a:endParaRPr lang="nl-NL"/>
-          </a:p>
-        </p:txBody>
-      </p:sp>
-    </p:spTree>
-    <p:extLst>
-      <p:ext uri="{BB962C8B-B14F-4D97-AF65-F5344CB8AC3E}">
-        <p14:creationId xmlns:p14="http://schemas.microsoft.com/office/powerpoint/2010/main" val="683142817"/>
-      </p:ext>
-    </p:extLst>
-  </p:cSld>
-  <p:clrMapOvr>
-    <a:masterClrMapping/>
-  </p:clrMapOvr>
-</p:sld>
-</file>
-
-<file path=ppt/slides/slide25.xml><?xml version="1.0" encoding="utf-8"?>
-<p:sld xmlns:a="http://schemas.openxmlformats.org/drawingml/2006/main" xmlns:r="http://schemas.openxmlformats.org/officeDocument/2006/relationships" xmlns:p="http://schemas.openxmlformats.org/presentationml/2006/main">
-  <p:cSld>
-    <p:spTree>
-      <p:nvGrpSpPr>
-        <p:cNvPr id="1" name=""/>
-        <p:cNvGrpSpPr/>
-        <p:nvPr/>
-      </p:nvGrpSpPr>
-      <p:grpSpPr>
-        <a:xfrm>
-          <a:off x="0" y="0"/>
-          <a:ext cx="0" cy="0"/>
-          <a:chOff x="0" y="0"/>
-          <a:chExt cx="0" cy="0"/>
-        </a:xfrm>
-      </p:grpSpPr>
-      <p:sp>
-        <p:nvSpPr>
           <p:cNvPr id="2" name="Title 1">
             <a:extLst>
               <a:ext uri="{FF2B5EF4-FFF2-40B4-BE49-F238E27FC236}">
@@ -11820,7 +11645,7 @@
           <a:p>
             <a:fld id="{14F1411D-0280-154F-AEAC-4C20B7AA46B2}" type="slidenum">
               <a:rPr lang="nl-NL" smtClean="0"/>
-              <a:t>25</a:t>
+              <a:t>24</a:t>
             </a:fld>
             <a:endParaRPr lang="nl-NL"/>
           </a:p>
@@ -11869,7 +11694,7 @@
 </p:sld>
 </file>
 
-<file path=ppt/slides/slide26.xml><?xml version="1.0" encoding="utf-8"?>
+<file path=ppt/slides/slide25.xml><?xml version="1.0" encoding="utf-8"?>
 <p:sld xmlns:a="http://schemas.openxmlformats.org/drawingml/2006/main" xmlns:r="http://schemas.openxmlformats.org/officeDocument/2006/relationships" xmlns:p="http://schemas.openxmlformats.org/presentationml/2006/main">
   <p:cSld>
     <p:spTree>
@@ -12053,7 +11878,7 @@
           <a:p>
             <a:fld id="{14F1411D-0280-154F-AEAC-4C20B7AA46B2}" type="slidenum">
               <a:rPr lang="nl-NL" smtClean="0"/>
-              <a:t>26</a:t>
+              <a:t>25</a:t>
             </a:fld>
             <a:endParaRPr lang="nl-NL"/>
           </a:p>
@@ -12102,7 +11927,7 @@
 </p:sld>
 </file>
 
-<file path=ppt/slides/slide27.xml><?xml version="1.0" encoding="utf-8"?>
+<file path=ppt/slides/slide26.xml><?xml version="1.0" encoding="utf-8"?>
 <p:sld xmlns:a="http://schemas.openxmlformats.org/drawingml/2006/main" xmlns:r="http://schemas.openxmlformats.org/officeDocument/2006/relationships" xmlns:p="http://schemas.openxmlformats.org/presentationml/2006/main">
   <p:cSld>
     <p:spTree>
@@ -12296,7 +12121,7 @@
           <a:p>
             <a:fld id="{14F1411D-0280-154F-AEAC-4C20B7AA46B2}" type="slidenum">
               <a:rPr lang="nl-NL" smtClean="0"/>
-              <a:t>27</a:t>
+              <a:t>26</a:t>
             </a:fld>
             <a:endParaRPr lang="nl-NL"/>
           </a:p>
@@ -12373,6 +12198,229 @@
 </p:sld>
 </file>
 
+<file path=ppt/slides/slide27.xml><?xml version="1.0" encoding="utf-8"?>
+<p:sld xmlns:a="http://schemas.openxmlformats.org/drawingml/2006/main" xmlns:r="http://schemas.openxmlformats.org/officeDocument/2006/relationships" xmlns:p="http://schemas.openxmlformats.org/presentationml/2006/main">
+  <p:cSld>
+    <p:spTree>
+      <p:nvGrpSpPr>
+        <p:cNvPr id="1" name=""/>
+        <p:cNvGrpSpPr/>
+        <p:nvPr/>
+      </p:nvGrpSpPr>
+      <p:grpSpPr>
+        <a:xfrm>
+          <a:off x="0" y="0"/>
+          <a:ext cx="0" cy="0"/>
+          <a:chOff x="0" y="0"/>
+          <a:chExt cx="0" cy="0"/>
+        </a:xfrm>
+      </p:grpSpPr>
+      <p:sp>
+        <p:nvSpPr>
+          <p:cNvPr id="2" name="Title 1">
+            <a:extLst>
+              <a:ext uri="{FF2B5EF4-FFF2-40B4-BE49-F238E27FC236}">
+                <a16:creationId xmlns:a16="http://schemas.microsoft.com/office/drawing/2014/main" id="{4427163C-56C0-4988-9EBE-D1A1A61F018A}"/>
+              </a:ext>
+            </a:extLst>
+          </p:cNvPr>
+          <p:cNvSpPr>
+            <a:spLocks noGrp="1"/>
+          </p:cNvSpPr>
+          <p:nvPr>
+            <p:ph type="title"/>
+          </p:nvPr>
+        </p:nvSpPr>
+        <p:spPr/>
+        <p:txBody>
+          <a:bodyPr/>
+          <a:lstStyle/>
+          <a:p>
+            <a:r>
+              <a:rPr lang="en-GB" dirty="0"/>
+              <a:t>JSON-based queries – full text queries(1)</a:t>
+            </a:r>
+            <a:endParaRPr lang="en-NL" dirty="0"/>
+          </a:p>
+        </p:txBody>
+      </p:sp>
+      <p:sp>
+        <p:nvSpPr>
+          <p:cNvPr id="3" name="Content Placeholder 2">
+            <a:extLst>
+              <a:ext uri="{FF2B5EF4-FFF2-40B4-BE49-F238E27FC236}">
+                <a16:creationId xmlns:a16="http://schemas.microsoft.com/office/drawing/2014/main" id="{24508C12-EA00-4258-A431-15166DB8847F}"/>
+              </a:ext>
+            </a:extLst>
+          </p:cNvPr>
+          <p:cNvSpPr>
+            <a:spLocks noGrp="1"/>
+          </p:cNvSpPr>
+          <p:nvPr>
+            <p:ph idx="1"/>
+          </p:nvPr>
+        </p:nvSpPr>
+        <p:spPr/>
+        <p:txBody>
+          <a:bodyPr/>
+          <a:lstStyle/>
+          <a:p>
+            <a:r>
+              <a:rPr lang="en-GB" dirty="0"/>
+              <a:t>Search analysed text fields</a:t>
+            </a:r>
+          </a:p>
+          <a:p>
+            <a:r>
+              <a:rPr lang="en-GB" dirty="0"/>
+              <a:t>Query string is analysed in same way as text field</a:t>
+            </a:r>
+          </a:p>
+          <a:p>
+            <a:r>
+              <a:rPr lang="en-GB" dirty="0"/>
+              <a:t>Queries: intervals, match, </a:t>
+            </a:r>
+            <a:r>
+              <a:rPr lang="en-GB" dirty="0" err="1"/>
+              <a:t>match_bool_prefix</a:t>
+            </a:r>
+            <a:r>
+              <a:rPr lang="en-GB" dirty="0"/>
+              <a:t>, </a:t>
+            </a:r>
+            <a:r>
+              <a:rPr lang="en-GB" dirty="0" err="1"/>
+              <a:t>match_phrase</a:t>
+            </a:r>
+            <a:r>
+              <a:rPr lang="en-GB" dirty="0"/>
+              <a:t>, </a:t>
+            </a:r>
+            <a:r>
+              <a:rPr lang="en-GB" dirty="0" err="1"/>
+              <a:t>match_phrase_prefix</a:t>
+            </a:r>
+            <a:r>
+              <a:rPr lang="en-GB" dirty="0"/>
+              <a:t>, </a:t>
+            </a:r>
+            <a:r>
+              <a:rPr lang="en-GB" dirty="0" err="1"/>
+              <a:t>multi_match</a:t>
+            </a:r>
+            <a:r>
+              <a:rPr lang="en-GB" dirty="0"/>
+              <a:t>, common terms (deprecated), </a:t>
+            </a:r>
+            <a:r>
+              <a:rPr lang="en-GB" dirty="0" err="1"/>
+              <a:t>query_string</a:t>
+            </a:r>
+            <a:r>
+              <a:rPr lang="en-GB" dirty="0"/>
+              <a:t>, </a:t>
+            </a:r>
+            <a:r>
+              <a:rPr lang="en-GB" dirty="0" err="1"/>
+              <a:t>simple_query_string</a:t>
+            </a:r>
+            <a:endParaRPr lang="en-GB" dirty="0"/>
+          </a:p>
+          <a:p>
+            <a:endParaRPr lang="en-GB" dirty="0"/>
+          </a:p>
+          <a:p>
+            <a:r>
+              <a:rPr lang="en-GB" dirty="0"/>
+              <a:t>query _string: has the same options and syntax as the q query param in URL-based requests</a:t>
+            </a:r>
+          </a:p>
+          <a:p>
+            <a:r>
+              <a:rPr lang="en-GB" dirty="0" err="1"/>
+              <a:t>simple_query_string</a:t>
+            </a:r>
+            <a:r>
+              <a:rPr lang="en-GB" dirty="0"/>
+              <a:t>: more limited but does not return errors for invalid syntax, ignores it instead</a:t>
+            </a:r>
+          </a:p>
+          <a:p>
+            <a:endParaRPr lang="en-GB" dirty="0"/>
+          </a:p>
+        </p:txBody>
+      </p:sp>
+      <p:sp>
+        <p:nvSpPr>
+          <p:cNvPr id="4" name="Footer Placeholder 3">
+            <a:extLst>
+              <a:ext uri="{FF2B5EF4-FFF2-40B4-BE49-F238E27FC236}">
+                <a16:creationId xmlns:a16="http://schemas.microsoft.com/office/drawing/2014/main" id="{171813CD-D280-45C6-92E1-0561F87F526F}"/>
+              </a:ext>
+            </a:extLst>
+          </p:cNvPr>
+          <p:cNvSpPr>
+            <a:spLocks noGrp="1"/>
+          </p:cNvSpPr>
+          <p:nvPr>
+            <p:ph type="ftr" sz="quarter" idx="11"/>
+          </p:nvPr>
+        </p:nvSpPr>
+        <p:spPr/>
+        <p:txBody>
+          <a:bodyPr/>
+          <a:lstStyle/>
+          <a:p>
+            <a:r>
+              <a:rPr lang="nl-NL"/>
+              <a:t>elasticsearch</a:t>
+            </a:r>
+          </a:p>
+        </p:txBody>
+      </p:sp>
+      <p:sp>
+        <p:nvSpPr>
+          <p:cNvPr id="5" name="Slide Number Placeholder 4">
+            <a:extLst>
+              <a:ext uri="{FF2B5EF4-FFF2-40B4-BE49-F238E27FC236}">
+                <a16:creationId xmlns:a16="http://schemas.microsoft.com/office/drawing/2014/main" id="{11B2E7AC-F0B2-43BF-91B3-56FBA77C6523}"/>
+              </a:ext>
+            </a:extLst>
+          </p:cNvPr>
+          <p:cNvSpPr>
+            <a:spLocks noGrp="1"/>
+          </p:cNvSpPr>
+          <p:nvPr>
+            <p:ph type="sldNum" sz="quarter" idx="12"/>
+          </p:nvPr>
+        </p:nvSpPr>
+        <p:spPr/>
+        <p:txBody>
+          <a:bodyPr/>
+          <a:lstStyle/>
+          <a:p>
+            <a:fld id="{14F1411D-0280-154F-AEAC-4C20B7AA46B2}" type="slidenum">
+              <a:rPr lang="nl-NL" smtClean="0"/>
+              <a:t>27</a:t>
+            </a:fld>
+            <a:endParaRPr lang="nl-NL"/>
+          </a:p>
+        </p:txBody>
+      </p:sp>
+    </p:spTree>
+    <p:extLst>
+      <p:ext uri="{BB962C8B-B14F-4D97-AF65-F5344CB8AC3E}">
+        <p14:creationId xmlns:p14="http://schemas.microsoft.com/office/powerpoint/2010/main" val="311206040"/>
+      </p:ext>
+    </p:extLst>
+  </p:cSld>
+  <p:clrMapOvr>
+    <a:masterClrMapping/>
+  </p:clrMapOvr>
+</p:sld>
+</file>
+
 <file path=ppt/slides/slide28.xml><?xml version="1.0" encoding="utf-8"?>
 <p:sld xmlns:a="http://schemas.openxmlformats.org/drawingml/2006/main" xmlns:r="http://schemas.openxmlformats.org/officeDocument/2006/relationships" xmlns:p="http://schemas.openxmlformats.org/presentationml/2006/main">
   <p:cSld>
@@ -12395,229 +12443,6 @@
           <p:cNvPr id="2" name="Title 1">
             <a:extLst>
               <a:ext uri="{FF2B5EF4-FFF2-40B4-BE49-F238E27FC236}">
-                <a16:creationId xmlns:a16="http://schemas.microsoft.com/office/drawing/2014/main" id="{4427163C-56C0-4988-9EBE-D1A1A61F018A}"/>
-              </a:ext>
-            </a:extLst>
-          </p:cNvPr>
-          <p:cNvSpPr>
-            <a:spLocks noGrp="1"/>
-          </p:cNvSpPr>
-          <p:nvPr>
-            <p:ph type="title"/>
-          </p:nvPr>
-        </p:nvSpPr>
-        <p:spPr/>
-        <p:txBody>
-          <a:bodyPr/>
-          <a:lstStyle/>
-          <a:p>
-            <a:r>
-              <a:rPr lang="en-GB" dirty="0"/>
-              <a:t>JSON-based queries – full text queries(1)</a:t>
-            </a:r>
-            <a:endParaRPr lang="en-NL" dirty="0"/>
-          </a:p>
-        </p:txBody>
-      </p:sp>
-      <p:sp>
-        <p:nvSpPr>
-          <p:cNvPr id="3" name="Content Placeholder 2">
-            <a:extLst>
-              <a:ext uri="{FF2B5EF4-FFF2-40B4-BE49-F238E27FC236}">
-                <a16:creationId xmlns:a16="http://schemas.microsoft.com/office/drawing/2014/main" id="{24508C12-EA00-4258-A431-15166DB8847F}"/>
-              </a:ext>
-            </a:extLst>
-          </p:cNvPr>
-          <p:cNvSpPr>
-            <a:spLocks noGrp="1"/>
-          </p:cNvSpPr>
-          <p:nvPr>
-            <p:ph idx="1"/>
-          </p:nvPr>
-        </p:nvSpPr>
-        <p:spPr/>
-        <p:txBody>
-          <a:bodyPr/>
-          <a:lstStyle/>
-          <a:p>
-            <a:r>
-              <a:rPr lang="en-GB" dirty="0"/>
-              <a:t>Search analysed text fields</a:t>
-            </a:r>
-          </a:p>
-          <a:p>
-            <a:r>
-              <a:rPr lang="en-GB" dirty="0"/>
-              <a:t>Query string is analysed in same way as text field</a:t>
-            </a:r>
-          </a:p>
-          <a:p>
-            <a:r>
-              <a:rPr lang="en-GB" dirty="0"/>
-              <a:t>Queries: intervals, match, </a:t>
-            </a:r>
-            <a:r>
-              <a:rPr lang="en-GB" dirty="0" err="1"/>
-              <a:t>match_bool_prefix</a:t>
-            </a:r>
-            <a:r>
-              <a:rPr lang="en-GB" dirty="0"/>
-              <a:t>, </a:t>
-            </a:r>
-            <a:r>
-              <a:rPr lang="en-GB" dirty="0" err="1"/>
-              <a:t>match_phrase</a:t>
-            </a:r>
-            <a:r>
-              <a:rPr lang="en-GB" dirty="0"/>
-              <a:t>, </a:t>
-            </a:r>
-            <a:r>
-              <a:rPr lang="en-GB" dirty="0" err="1"/>
-              <a:t>match_phrase_prefix</a:t>
-            </a:r>
-            <a:r>
-              <a:rPr lang="en-GB" dirty="0"/>
-              <a:t>, </a:t>
-            </a:r>
-            <a:r>
-              <a:rPr lang="en-GB" dirty="0" err="1"/>
-              <a:t>multi_match</a:t>
-            </a:r>
-            <a:r>
-              <a:rPr lang="en-GB" dirty="0"/>
-              <a:t>, common terms (deprecated), </a:t>
-            </a:r>
-            <a:r>
-              <a:rPr lang="en-GB" dirty="0" err="1"/>
-              <a:t>query_string</a:t>
-            </a:r>
-            <a:r>
-              <a:rPr lang="en-GB" dirty="0"/>
-              <a:t>, </a:t>
-            </a:r>
-            <a:r>
-              <a:rPr lang="en-GB" dirty="0" err="1"/>
-              <a:t>simple_query_string</a:t>
-            </a:r>
-            <a:endParaRPr lang="en-GB" dirty="0"/>
-          </a:p>
-          <a:p>
-            <a:endParaRPr lang="en-GB" dirty="0"/>
-          </a:p>
-          <a:p>
-            <a:r>
-              <a:rPr lang="en-GB" dirty="0"/>
-              <a:t>query _string: has the same options and syntax as the q query param in URL-based requests</a:t>
-            </a:r>
-          </a:p>
-          <a:p>
-            <a:r>
-              <a:rPr lang="en-GB" dirty="0" err="1"/>
-              <a:t>simple_query_string</a:t>
-            </a:r>
-            <a:r>
-              <a:rPr lang="en-GB" dirty="0"/>
-              <a:t>: more limited but does not return errors for invalid syntax, ignores it instead</a:t>
-            </a:r>
-          </a:p>
-          <a:p>
-            <a:endParaRPr lang="en-GB" dirty="0"/>
-          </a:p>
-        </p:txBody>
-      </p:sp>
-      <p:sp>
-        <p:nvSpPr>
-          <p:cNvPr id="4" name="Footer Placeholder 3">
-            <a:extLst>
-              <a:ext uri="{FF2B5EF4-FFF2-40B4-BE49-F238E27FC236}">
-                <a16:creationId xmlns:a16="http://schemas.microsoft.com/office/drawing/2014/main" id="{171813CD-D280-45C6-92E1-0561F87F526F}"/>
-              </a:ext>
-            </a:extLst>
-          </p:cNvPr>
-          <p:cNvSpPr>
-            <a:spLocks noGrp="1"/>
-          </p:cNvSpPr>
-          <p:nvPr>
-            <p:ph type="ftr" sz="quarter" idx="11"/>
-          </p:nvPr>
-        </p:nvSpPr>
-        <p:spPr/>
-        <p:txBody>
-          <a:bodyPr/>
-          <a:lstStyle/>
-          <a:p>
-            <a:r>
-              <a:rPr lang="nl-NL"/>
-              <a:t>elasticsearch</a:t>
-            </a:r>
-          </a:p>
-        </p:txBody>
-      </p:sp>
-      <p:sp>
-        <p:nvSpPr>
-          <p:cNvPr id="5" name="Slide Number Placeholder 4">
-            <a:extLst>
-              <a:ext uri="{FF2B5EF4-FFF2-40B4-BE49-F238E27FC236}">
-                <a16:creationId xmlns:a16="http://schemas.microsoft.com/office/drawing/2014/main" id="{11B2E7AC-F0B2-43BF-91B3-56FBA77C6523}"/>
-              </a:ext>
-            </a:extLst>
-          </p:cNvPr>
-          <p:cNvSpPr>
-            <a:spLocks noGrp="1"/>
-          </p:cNvSpPr>
-          <p:nvPr>
-            <p:ph type="sldNum" sz="quarter" idx="12"/>
-          </p:nvPr>
-        </p:nvSpPr>
-        <p:spPr/>
-        <p:txBody>
-          <a:bodyPr/>
-          <a:lstStyle/>
-          <a:p>
-            <a:fld id="{14F1411D-0280-154F-AEAC-4C20B7AA46B2}" type="slidenum">
-              <a:rPr lang="nl-NL" smtClean="0"/>
-              <a:t>28</a:t>
-            </a:fld>
-            <a:endParaRPr lang="nl-NL"/>
-          </a:p>
-        </p:txBody>
-      </p:sp>
-    </p:spTree>
-    <p:extLst>
-      <p:ext uri="{BB962C8B-B14F-4D97-AF65-F5344CB8AC3E}">
-        <p14:creationId xmlns:p14="http://schemas.microsoft.com/office/powerpoint/2010/main" val="311206040"/>
-      </p:ext>
-    </p:extLst>
-  </p:cSld>
-  <p:clrMapOvr>
-    <a:masterClrMapping/>
-  </p:clrMapOvr>
-</p:sld>
-</file>
-
-<file path=ppt/slides/slide29.xml><?xml version="1.0" encoding="utf-8"?>
-<p:sld xmlns:a="http://schemas.openxmlformats.org/drawingml/2006/main" xmlns:r="http://schemas.openxmlformats.org/officeDocument/2006/relationships" xmlns:p="http://schemas.openxmlformats.org/presentationml/2006/main">
-  <p:cSld>
-    <p:spTree>
-      <p:nvGrpSpPr>
-        <p:cNvPr id="1" name=""/>
-        <p:cNvGrpSpPr/>
-        <p:nvPr/>
-      </p:nvGrpSpPr>
-      <p:grpSpPr>
-        <a:xfrm>
-          <a:off x="0" y="0"/>
-          <a:ext cx="0" cy="0"/>
-          <a:chOff x="0" y="0"/>
-          <a:chExt cx="0" cy="0"/>
-        </a:xfrm>
-      </p:grpSpPr>
-      <p:sp>
-        <p:nvSpPr>
-          <p:cNvPr id="2" name="Title 1">
-            <a:extLst>
-              <a:ext uri="{FF2B5EF4-FFF2-40B4-BE49-F238E27FC236}">
                 <a16:creationId xmlns:a16="http://schemas.microsoft.com/office/drawing/2014/main" id="{435EE54A-EDB7-44AE-97EE-646026D7E018}"/>
               </a:ext>
             </a:extLst>
@@ -12732,7 +12557,7 @@
           <a:p>
             <a:fld id="{14F1411D-0280-154F-AEAC-4C20B7AA46B2}" type="slidenum">
               <a:rPr lang="nl-NL" smtClean="0"/>
-              <a:t>29</a:t>
+              <a:t>28</a:t>
             </a:fld>
             <a:endParaRPr lang="nl-NL"/>
           </a:p>
@@ -12809,6 +12634,223 @@
 </p:sld>
 </file>
 
+<file path=ppt/slides/slide29.xml><?xml version="1.0" encoding="utf-8"?>
+<p:sld xmlns:a="http://schemas.openxmlformats.org/drawingml/2006/main" xmlns:r="http://schemas.openxmlformats.org/officeDocument/2006/relationships" xmlns:p="http://schemas.openxmlformats.org/presentationml/2006/main">
+  <p:cSld>
+    <p:spTree>
+      <p:nvGrpSpPr>
+        <p:cNvPr id="1" name=""/>
+        <p:cNvGrpSpPr/>
+        <p:nvPr/>
+      </p:nvGrpSpPr>
+      <p:grpSpPr>
+        <a:xfrm>
+          <a:off x="0" y="0"/>
+          <a:ext cx="0" cy="0"/>
+          <a:chOff x="0" y="0"/>
+          <a:chExt cx="0" cy="0"/>
+        </a:xfrm>
+      </p:grpSpPr>
+      <p:sp>
+        <p:nvSpPr>
+          <p:cNvPr id="2" name="Title 1">
+            <a:extLst>
+              <a:ext uri="{FF2B5EF4-FFF2-40B4-BE49-F238E27FC236}">
+                <a16:creationId xmlns:a16="http://schemas.microsoft.com/office/drawing/2014/main" id="{0A876437-F2FB-4E69-95AD-7906C55BB384}"/>
+              </a:ext>
+            </a:extLst>
+          </p:cNvPr>
+          <p:cNvSpPr>
+            <a:spLocks noGrp="1"/>
+          </p:cNvSpPr>
+          <p:nvPr>
+            <p:ph type="title"/>
+          </p:nvPr>
+        </p:nvSpPr>
+        <p:spPr/>
+        <p:txBody>
+          <a:bodyPr/>
+          <a:lstStyle/>
+          <a:p>
+            <a:r>
+              <a:rPr lang="en-GB" dirty="0"/>
+              <a:t>JSON-based queries – full text queries(3)</a:t>
+            </a:r>
+            <a:endParaRPr lang="en-NL" dirty="0"/>
+          </a:p>
+        </p:txBody>
+      </p:sp>
+      <p:sp>
+        <p:nvSpPr>
+          <p:cNvPr id="3" name="Content Placeholder 2">
+            <a:extLst>
+              <a:ext uri="{FF2B5EF4-FFF2-40B4-BE49-F238E27FC236}">
+                <a16:creationId xmlns:a16="http://schemas.microsoft.com/office/drawing/2014/main" id="{129841FA-08D2-48D3-B2FB-40E294C20F55}"/>
+              </a:ext>
+            </a:extLst>
+          </p:cNvPr>
+          <p:cNvSpPr>
+            <a:spLocks noGrp="1"/>
+          </p:cNvSpPr>
+          <p:nvPr>
+            <p:ph idx="1"/>
+          </p:nvPr>
+        </p:nvSpPr>
+        <p:spPr/>
+        <p:txBody>
+          <a:bodyPr/>
+          <a:lstStyle/>
+          <a:p>
+            <a:r>
+              <a:rPr lang="en-GB" dirty="0" err="1"/>
+              <a:t>match_phrase</a:t>
+            </a:r>
+            <a:r>
+              <a:rPr lang="en-GB" dirty="0"/>
+              <a:t>: match a phrase precisely or provide the “slop” parameter to allow some words in between.</a:t>
+            </a:r>
+          </a:p>
+          <a:p>
+            <a:r>
+              <a:rPr lang="en-GB" dirty="0" err="1"/>
+              <a:t>match_phrase_prefix</a:t>
+            </a:r>
+            <a:r>
+              <a:rPr lang="en-GB" dirty="0"/>
+              <a:t>: last term is treated as prefix, matching any word beginning with that term</a:t>
+            </a:r>
+          </a:p>
+          <a:p>
+            <a:r>
+              <a:rPr lang="en-GB" dirty="0" err="1"/>
+              <a:t>match_bool_prefix</a:t>
+            </a:r>
+            <a:r>
+              <a:rPr lang="en-GB" dirty="0"/>
+              <a:t>: match terms in any position, not in specific order</a:t>
+            </a:r>
+          </a:p>
+          <a:p>
+            <a:endParaRPr lang="en-GB" dirty="0"/>
+          </a:p>
+          <a:p>
+            <a:r>
+              <a:rPr lang="en-GB" dirty="0"/>
+              <a:t>intervals: search documents based on order and proximity of terms</a:t>
+            </a:r>
+          </a:p>
+          <a:p>
+            <a:endParaRPr lang="en-GB" dirty="0"/>
+          </a:p>
+          <a:p>
+            <a:endParaRPr lang="en-GB" dirty="0"/>
+          </a:p>
+          <a:p>
+            <a:endParaRPr lang="nl-NL" sz="1100" dirty="0">
+              <a:hlinkClick r:id="rId2"/>
+            </a:endParaRPr>
+          </a:p>
+          <a:p>
+            <a:endParaRPr lang="nl-NL" sz="1100" dirty="0">
+              <a:hlinkClick r:id="rId2"/>
+            </a:endParaRPr>
+          </a:p>
+          <a:p>
+            <a:endParaRPr lang="nl-NL" sz="1100" dirty="0">
+              <a:hlinkClick r:id="rId2"/>
+            </a:endParaRPr>
+          </a:p>
+          <a:p>
+            <a:endParaRPr lang="nl-NL" sz="1100" dirty="0">
+              <a:hlinkClick r:id="rId2"/>
+            </a:endParaRPr>
+          </a:p>
+          <a:p>
+            <a:endParaRPr lang="nl-NL" sz="1100" dirty="0">
+              <a:hlinkClick r:id="rId2"/>
+            </a:endParaRPr>
+          </a:p>
+          <a:p>
+            <a:r>
+              <a:rPr lang="nl-NL" sz="1100" dirty="0">
+                <a:hlinkClick r:id="rId2"/>
+              </a:rPr>
+              <a:t>https://www.elastic.co/guide/en/elasticsearch/reference/current/full-text-queries.html</a:t>
+            </a:r>
+            <a:endParaRPr lang="en-NL" sz="1100" dirty="0"/>
+          </a:p>
+        </p:txBody>
+      </p:sp>
+      <p:sp>
+        <p:nvSpPr>
+          <p:cNvPr id="4" name="Footer Placeholder 3">
+            <a:extLst>
+              <a:ext uri="{FF2B5EF4-FFF2-40B4-BE49-F238E27FC236}">
+                <a16:creationId xmlns:a16="http://schemas.microsoft.com/office/drawing/2014/main" id="{DE42CBC2-3946-418E-9984-42AB33A6B664}"/>
+              </a:ext>
+            </a:extLst>
+          </p:cNvPr>
+          <p:cNvSpPr>
+            <a:spLocks noGrp="1"/>
+          </p:cNvSpPr>
+          <p:nvPr>
+            <p:ph type="ftr" sz="quarter" idx="11"/>
+          </p:nvPr>
+        </p:nvSpPr>
+        <p:spPr/>
+        <p:txBody>
+          <a:bodyPr/>
+          <a:lstStyle/>
+          <a:p>
+            <a:r>
+              <a:rPr lang="nl-NL"/>
+              <a:t>elasticsearch</a:t>
+            </a:r>
+          </a:p>
+        </p:txBody>
+      </p:sp>
+      <p:sp>
+        <p:nvSpPr>
+          <p:cNvPr id="5" name="Slide Number Placeholder 4">
+            <a:extLst>
+              <a:ext uri="{FF2B5EF4-FFF2-40B4-BE49-F238E27FC236}">
+                <a16:creationId xmlns:a16="http://schemas.microsoft.com/office/drawing/2014/main" id="{69AB646A-BDCC-4ED3-B628-369F043C3DEA}"/>
+              </a:ext>
+            </a:extLst>
+          </p:cNvPr>
+          <p:cNvSpPr>
+            <a:spLocks noGrp="1"/>
+          </p:cNvSpPr>
+          <p:nvPr>
+            <p:ph type="sldNum" sz="quarter" idx="12"/>
+          </p:nvPr>
+        </p:nvSpPr>
+        <p:spPr/>
+        <p:txBody>
+          <a:bodyPr/>
+          <a:lstStyle/>
+          <a:p>
+            <a:fld id="{14F1411D-0280-154F-AEAC-4C20B7AA46B2}" type="slidenum">
+              <a:rPr lang="nl-NL" smtClean="0"/>
+              <a:t>29</a:t>
+            </a:fld>
+            <a:endParaRPr lang="nl-NL"/>
+          </a:p>
+        </p:txBody>
+      </p:sp>
+    </p:spTree>
+    <p:extLst>
+      <p:ext uri="{BB962C8B-B14F-4D97-AF65-F5344CB8AC3E}">
+        <p14:creationId xmlns:p14="http://schemas.microsoft.com/office/powerpoint/2010/main" val="3103263932"/>
+      </p:ext>
+    </p:extLst>
+  </p:cSld>
+  <p:clrMapOvr>
+    <a:masterClrMapping/>
+  </p:clrMapOvr>
+</p:sld>
+</file>
+
 <file path=ppt/slides/slide3.xml><?xml version="1.0" encoding="utf-8"?>
 <p:sld xmlns:a="http://schemas.openxmlformats.org/drawingml/2006/main" xmlns:r="http://schemas.openxmlformats.org/officeDocument/2006/relationships" xmlns:p="http://schemas.openxmlformats.org/presentationml/2006/main">
   <p:cSld>
@@ -13009,7 +13051,7 @@
           <p:cNvPr id="2" name="Title 1">
             <a:extLst>
               <a:ext uri="{FF2B5EF4-FFF2-40B4-BE49-F238E27FC236}">
-                <a16:creationId xmlns:a16="http://schemas.microsoft.com/office/drawing/2014/main" id="{0A876437-F2FB-4E69-95AD-7906C55BB384}"/>
+                <a16:creationId xmlns:a16="http://schemas.microsoft.com/office/drawing/2014/main" id="{7E0C864F-8D7E-4A1F-9FBF-8840FD06DD82}"/>
               </a:ext>
             </a:extLst>
           </p:cNvPr>
@@ -13027,7 +13069,7 @@
           <a:p>
             <a:r>
               <a:rPr lang="en-GB" dirty="0"/>
-              <a:t>JSON-based queries – full text queries(3)</a:t>
+              <a:t>JSON-based queries – compound queries(1)</a:t>
             </a:r>
             <a:endParaRPr lang="en-NL" dirty="0"/>
           </a:p>
@@ -13038,7 +13080,7 @@
           <p:cNvPr id="3" name="Content Placeholder 2">
             <a:extLst>
               <a:ext uri="{FF2B5EF4-FFF2-40B4-BE49-F238E27FC236}">
-                <a16:creationId xmlns:a16="http://schemas.microsoft.com/office/drawing/2014/main" id="{129841FA-08D2-48D3-B2FB-40E294C20F55}"/>
+                <a16:creationId xmlns:a16="http://schemas.microsoft.com/office/drawing/2014/main" id="{2B238913-DCE4-4551-93BE-7D0E5C113D13}"/>
               </a:ext>
             </a:extLst>
           </p:cNvPr>
@@ -13055,82 +13097,93 @@
           <a:lstStyle/>
           <a:p>
             <a:r>
+              <a:rPr lang="en-GB" dirty="0"/>
+              <a:t>Wrap other (compound) queries to combine results, change query behaviour or use a filter</a:t>
+            </a:r>
+          </a:p>
+          <a:p>
+            <a:pPr lvl="1"/>
+            <a:r>
+              <a:rPr lang="en-GB" sz="1400" dirty="0"/>
+              <a:t>No score is calculated for results that are filtered out</a:t>
+            </a:r>
+          </a:p>
+          <a:p>
+            <a:pPr lvl="1"/>
+            <a:r>
+              <a:rPr lang="en-GB" sz="1400" dirty="0"/>
+              <a:t>Often used filters are cached by </a:t>
+            </a:r>
+            <a:r>
+              <a:rPr lang="en-GB" sz="1400" dirty="0" err="1"/>
+              <a:t>elasticsearch</a:t>
+            </a:r>
+            <a:endParaRPr lang="en-GB" sz="1400" dirty="0"/>
+          </a:p>
+          <a:p>
+            <a:r>
+              <a:rPr lang="en-GB" dirty="0"/>
+              <a:t>Queries: bool (</a:t>
+            </a:r>
+            <a:r>
               <a:rPr lang="en-GB" dirty="0" err="1"/>
-              <a:t>match_phrase</a:t>
+              <a:t>boolean</a:t>
             </a:r>
             <a:r>
               <a:rPr lang="en-GB" dirty="0"/>
-              <a:t>: match a phrase precisely or provide the “slop” parameter to allow some words in between.</a:t>
-            </a:r>
-          </a:p>
-          <a:p>
+              <a:t>), boosting, </a:t>
+            </a:r>
             <a:r>
               <a:rPr lang="en-GB" dirty="0" err="1"/>
-              <a:t>match_phrase_prefix</a:t>
+              <a:t>constant_score</a:t>
             </a:r>
             <a:r>
               <a:rPr lang="en-GB" dirty="0"/>
-              <a:t>: last term is treated as prefix, matching any word beginning with that term</a:t>
-            </a:r>
-          </a:p>
-          <a:p>
+              <a:t>, </a:t>
+            </a:r>
             <a:r>
               <a:rPr lang="en-GB" dirty="0" err="1"/>
-              <a:t>match_bool_prefix</a:t>
+              <a:t>dis_max</a:t>
             </a:r>
             <a:r>
               <a:rPr lang="en-GB" dirty="0"/>
-              <a:t>: match terms in any position, not in specific order</a:t>
-            </a:r>
-          </a:p>
-          <a:p>
+              <a:t> (disjunction max), </a:t>
+            </a:r>
+            <a:r>
+              <a:rPr lang="en-GB" dirty="0" err="1"/>
+              <a:t>function_score</a:t>
+            </a:r>
             <a:endParaRPr lang="en-GB" dirty="0"/>
           </a:p>
           <a:p>
+            <a:endParaRPr lang="en-GB" dirty="0"/>
+          </a:p>
+          <a:p>
             <a:r>
               <a:rPr lang="en-GB" dirty="0"/>
-              <a:t>intervals: search documents based on order and proximity of terms</a:t>
-            </a:r>
-          </a:p>
-          <a:p>
+              <a:t>For manipulating scores: boosting, </a:t>
+            </a:r>
+            <a:r>
+              <a:rPr lang="en-GB" dirty="0" err="1"/>
+              <a:t>constant_score</a:t>
+            </a:r>
+            <a:r>
+              <a:rPr lang="en-GB" dirty="0"/>
+              <a:t>, </a:t>
+            </a:r>
+            <a:r>
+              <a:rPr lang="en-GB" dirty="0" err="1"/>
+              <a:t>dis_max</a:t>
+            </a:r>
+            <a:r>
+              <a:rPr lang="en-GB" dirty="0"/>
+              <a:t>, and </a:t>
+            </a:r>
+            <a:r>
+              <a:rPr lang="en-GB" dirty="0" err="1"/>
+              <a:t>function_score</a:t>
+            </a:r>
             <a:endParaRPr lang="en-GB" dirty="0"/>
-          </a:p>
-          <a:p>
-            <a:endParaRPr lang="en-GB" dirty="0"/>
-          </a:p>
-          <a:p>
-            <a:endParaRPr lang="nl-NL" sz="1100" dirty="0">
-              <a:hlinkClick r:id="rId2"/>
-            </a:endParaRPr>
-          </a:p>
-          <a:p>
-            <a:endParaRPr lang="nl-NL" sz="1100" dirty="0">
-              <a:hlinkClick r:id="rId2"/>
-            </a:endParaRPr>
-          </a:p>
-          <a:p>
-            <a:endParaRPr lang="nl-NL" sz="1100" dirty="0">
-              <a:hlinkClick r:id="rId2"/>
-            </a:endParaRPr>
-          </a:p>
-          <a:p>
-            <a:endParaRPr lang="nl-NL" sz="1100" dirty="0">
-              <a:hlinkClick r:id="rId2"/>
-            </a:endParaRPr>
-          </a:p>
-          <a:p>
-            <a:endParaRPr lang="nl-NL" sz="1100" dirty="0">
-              <a:hlinkClick r:id="rId2"/>
-            </a:endParaRPr>
-          </a:p>
-          <a:p>
-            <a:r>
-              <a:rPr lang="nl-NL" sz="1100" dirty="0">
-                <a:hlinkClick r:id="rId2"/>
-              </a:rPr>
-              <a:t>https://www.elastic.co/guide/en/elasticsearch/reference/current/full-text-queries.html</a:t>
-            </a:r>
-            <a:endParaRPr lang="en-NL" sz="1100" dirty="0"/>
           </a:p>
         </p:txBody>
       </p:sp>
@@ -13139,7 +13192,7 @@
           <p:cNvPr id="4" name="Footer Placeholder 3">
             <a:extLst>
               <a:ext uri="{FF2B5EF4-FFF2-40B4-BE49-F238E27FC236}">
-                <a16:creationId xmlns:a16="http://schemas.microsoft.com/office/drawing/2014/main" id="{DE42CBC2-3946-418E-9984-42AB33A6B664}"/>
+                <a16:creationId xmlns:a16="http://schemas.microsoft.com/office/drawing/2014/main" id="{F1690C5F-F470-4B05-AB59-CBE30FDE51F0}"/>
               </a:ext>
             </a:extLst>
           </p:cNvPr>
@@ -13167,7 +13220,7 @@
           <p:cNvPr id="5" name="Slide Number Placeholder 4">
             <a:extLst>
               <a:ext uri="{FF2B5EF4-FFF2-40B4-BE49-F238E27FC236}">
-                <a16:creationId xmlns:a16="http://schemas.microsoft.com/office/drawing/2014/main" id="{69AB646A-BDCC-4ED3-B628-369F043C3DEA}"/>
+                <a16:creationId xmlns:a16="http://schemas.microsoft.com/office/drawing/2014/main" id="{1A34282B-2261-48E1-834B-16C626B887A4}"/>
               </a:ext>
             </a:extLst>
           </p:cNvPr>
@@ -13194,7 +13247,7 @@
     </p:spTree>
     <p:extLst>
       <p:ext uri="{BB962C8B-B14F-4D97-AF65-F5344CB8AC3E}">
-        <p14:creationId xmlns:p14="http://schemas.microsoft.com/office/powerpoint/2010/main" val="3103263932"/>
+        <p14:creationId xmlns:p14="http://schemas.microsoft.com/office/powerpoint/2010/main" val="2152417423"/>
       </p:ext>
     </p:extLst>
   </p:cSld>
@@ -13226,234 +13279,6 @@
           <p:cNvPr id="2" name="Title 1">
             <a:extLst>
               <a:ext uri="{FF2B5EF4-FFF2-40B4-BE49-F238E27FC236}">
-                <a16:creationId xmlns:a16="http://schemas.microsoft.com/office/drawing/2014/main" id="{7E0C864F-8D7E-4A1F-9FBF-8840FD06DD82}"/>
-              </a:ext>
-            </a:extLst>
-          </p:cNvPr>
-          <p:cNvSpPr>
-            <a:spLocks noGrp="1"/>
-          </p:cNvSpPr>
-          <p:nvPr>
-            <p:ph type="title"/>
-          </p:nvPr>
-        </p:nvSpPr>
-        <p:spPr/>
-        <p:txBody>
-          <a:bodyPr/>
-          <a:lstStyle/>
-          <a:p>
-            <a:r>
-              <a:rPr lang="en-GB" dirty="0"/>
-              <a:t>JSON-based queries – compound queries(1)</a:t>
-            </a:r>
-            <a:endParaRPr lang="en-NL" dirty="0"/>
-          </a:p>
-        </p:txBody>
-      </p:sp>
-      <p:sp>
-        <p:nvSpPr>
-          <p:cNvPr id="3" name="Content Placeholder 2">
-            <a:extLst>
-              <a:ext uri="{FF2B5EF4-FFF2-40B4-BE49-F238E27FC236}">
-                <a16:creationId xmlns:a16="http://schemas.microsoft.com/office/drawing/2014/main" id="{2B238913-DCE4-4551-93BE-7D0E5C113D13}"/>
-              </a:ext>
-            </a:extLst>
-          </p:cNvPr>
-          <p:cNvSpPr>
-            <a:spLocks noGrp="1"/>
-          </p:cNvSpPr>
-          <p:nvPr>
-            <p:ph idx="1"/>
-          </p:nvPr>
-        </p:nvSpPr>
-        <p:spPr/>
-        <p:txBody>
-          <a:bodyPr/>
-          <a:lstStyle/>
-          <a:p>
-            <a:r>
-              <a:rPr lang="en-GB" dirty="0"/>
-              <a:t>Wrap other (compound) queries to combine results, change query behaviour or use a filter</a:t>
-            </a:r>
-          </a:p>
-          <a:p>
-            <a:pPr lvl="1"/>
-            <a:r>
-              <a:rPr lang="en-GB" sz="1400" dirty="0"/>
-              <a:t>No score is calculated for results that are filtered out</a:t>
-            </a:r>
-          </a:p>
-          <a:p>
-            <a:pPr lvl="1"/>
-            <a:r>
-              <a:rPr lang="en-GB" sz="1400" dirty="0"/>
-              <a:t>Often used filters are cached by </a:t>
-            </a:r>
-            <a:r>
-              <a:rPr lang="en-GB" sz="1400" dirty="0" err="1"/>
-              <a:t>elasticsearch</a:t>
-            </a:r>
-            <a:endParaRPr lang="en-GB" sz="1400" dirty="0"/>
-          </a:p>
-          <a:p>
-            <a:r>
-              <a:rPr lang="en-GB" dirty="0"/>
-              <a:t>Queries: bool (</a:t>
-            </a:r>
-            <a:r>
-              <a:rPr lang="en-GB" dirty="0" err="1"/>
-              <a:t>boolean</a:t>
-            </a:r>
-            <a:r>
-              <a:rPr lang="en-GB" dirty="0"/>
-              <a:t>), boosting, </a:t>
-            </a:r>
-            <a:r>
-              <a:rPr lang="en-GB" dirty="0" err="1"/>
-              <a:t>constant_score</a:t>
-            </a:r>
-            <a:r>
-              <a:rPr lang="en-GB" dirty="0"/>
-              <a:t>, </a:t>
-            </a:r>
-            <a:r>
-              <a:rPr lang="en-GB" dirty="0" err="1"/>
-              <a:t>dis_max</a:t>
-            </a:r>
-            <a:r>
-              <a:rPr lang="en-GB" dirty="0"/>
-              <a:t> (disjunction max), </a:t>
-            </a:r>
-            <a:r>
-              <a:rPr lang="en-GB" dirty="0" err="1"/>
-              <a:t>function_score</a:t>
-            </a:r>
-            <a:endParaRPr lang="en-GB" dirty="0"/>
-          </a:p>
-          <a:p>
-            <a:endParaRPr lang="en-GB" dirty="0"/>
-          </a:p>
-          <a:p>
-            <a:r>
-              <a:rPr lang="en-GB" dirty="0"/>
-              <a:t>For manipulating scores: boosting, </a:t>
-            </a:r>
-            <a:r>
-              <a:rPr lang="en-GB" dirty="0" err="1"/>
-              <a:t>constant_score</a:t>
-            </a:r>
-            <a:r>
-              <a:rPr lang="en-GB" dirty="0"/>
-              <a:t>, </a:t>
-            </a:r>
-            <a:r>
-              <a:rPr lang="en-GB" dirty="0" err="1"/>
-              <a:t>dis_max</a:t>
-            </a:r>
-            <a:r>
-              <a:rPr lang="en-GB" dirty="0"/>
-              <a:t>, and </a:t>
-            </a:r>
-            <a:r>
-              <a:rPr lang="en-GB" dirty="0" err="1"/>
-              <a:t>function_score</a:t>
-            </a:r>
-            <a:endParaRPr lang="en-GB" dirty="0"/>
-          </a:p>
-        </p:txBody>
-      </p:sp>
-      <p:sp>
-        <p:nvSpPr>
-          <p:cNvPr id="4" name="Footer Placeholder 3">
-            <a:extLst>
-              <a:ext uri="{FF2B5EF4-FFF2-40B4-BE49-F238E27FC236}">
-                <a16:creationId xmlns:a16="http://schemas.microsoft.com/office/drawing/2014/main" id="{F1690C5F-F470-4B05-AB59-CBE30FDE51F0}"/>
-              </a:ext>
-            </a:extLst>
-          </p:cNvPr>
-          <p:cNvSpPr>
-            <a:spLocks noGrp="1"/>
-          </p:cNvSpPr>
-          <p:nvPr>
-            <p:ph type="ftr" sz="quarter" idx="11"/>
-          </p:nvPr>
-        </p:nvSpPr>
-        <p:spPr/>
-        <p:txBody>
-          <a:bodyPr/>
-          <a:lstStyle/>
-          <a:p>
-            <a:r>
-              <a:rPr lang="nl-NL"/>
-              <a:t>elasticsearch</a:t>
-            </a:r>
-          </a:p>
-        </p:txBody>
-      </p:sp>
-      <p:sp>
-        <p:nvSpPr>
-          <p:cNvPr id="5" name="Slide Number Placeholder 4">
-            <a:extLst>
-              <a:ext uri="{FF2B5EF4-FFF2-40B4-BE49-F238E27FC236}">
-                <a16:creationId xmlns:a16="http://schemas.microsoft.com/office/drawing/2014/main" id="{1A34282B-2261-48E1-834B-16C626B887A4}"/>
-              </a:ext>
-            </a:extLst>
-          </p:cNvPr>
-          <p:cNvSpPr>
-            <a:spLocks noGrp="1"/>
-          </p:cNvSpPr>
-          <p:nvPr>
-            <p:ph type="sldNum" sz="quarter" idx="12"/>
-          </p:nvPr>
-        </p:nvSpPr>
-        <p:spPr/>
-        <p:txBody>
-          <a:bodyPr/>
-          <a:lstStyle/>
-          <a:p>
-            <a:fld id="{14F1411D-0280-154F-AEAC-4C20B7AA46B2}" type="slidenum">
-              <a:rPr lang="nl-NL" smtClean="0"/>
-              <a:t>31</a:t>
-            </a:fld>
-            <a:endParaRPr lang="nl-NL"/>
-          </a:p>
-        </p:txBody>
-      </p:sp>
-    </p:spTree>
-    <p:extLst>
-      <p:ext uri="{BB962C8B-B14F-4D97-AF65-F5344CB8AC3E}">
-        <p14:creationId xmlns:p14="http://schemas.microsoft.com/office/powerpoint/2010/main" val="2152417423"/>
-      </p:ext>
-    </p:extLst>
-  </p:cSld>
-  <p:clrMapOvr>
-    <a:masterClrMapping/>
-  </p:clrMapOvr>
-</p:sld>
-</file>
-
-<file path=ppt/slides/slide32.xml><?xml version="1.0" encoding="utf-8"?>
-<p:sld xmlns:a="http://schemas.openxmlformats.org/drawingml/2006/main" xmlns:r="http://schemas.openxmlformats.org/officeDocument/2006/relationships" xmlns:p="http://schemas.openxmlformats.org/presentationml/2006/main">
-  <p:cSld>
-    <p:spTree>
-      <p:nvGrpSpPr>
-        <p:cNvPr id="1" name=""/>
-        <p:cNvGrpSpPr/>
-        <p:nvPr/>
-      </p:nvGrpSpPr>
-      <p:grpSpPr>
-        <a:xfrm>
-          <a:off x="0" y="0"/>
-          <a:ext cx="0" cy="0"/>
-          <a:chOff x="0" y="0"/>
-          <a:chExt cx="0" cy="0"/>
-        </a:xfrm>
-      </p:grpSpPr>
-      <p:sp>
-        <p:nvSpPr>
-          <p:cNvPr id="2" name="Title 1">
-            <a:extLst>
-              <a:ext uri="{FF2B5EF4-FFF2-40B4-BE49-F238E27FC236}">
                 <a16:creationId xmlns:a16="http://schemas.microsoft.com/office/drawing/2014/main" id="{E3757799-83EA-4342-8812-939E96764E4D}"/>
               </a:ext>
             </a:extLst>
@@ -13638,7 +13463,7 @@
           <a:p>
             <a:fld id="{14F1411D-0280-154F-AEAC-4C20B7AA46B2}" type="slidenum">
               <a:rPr lang="nl-NL" smtClean="0"/>
-              <a:t>32</a:t>
+              <a:t>31</a:t>
             </a:fld>
             <a:endParaRPr lang="nl-NL"/>
           </a:p>
@@ -13689,6 +13514,201 @@
 </p:sld>
 </file>
 
+<file path=ppt/slides/slide32.xml><?xml version="1.0" encoding="utf-8"?>
+<p:sld xmlns:a="http://schemas.openxmlformats.org/drawingml/2006/main" xmlns:r="http://schemas.openxmlformats.org/officeDocument/2006/relationships" xmlns:p="http://schemas.openxmlformats.org/presentationml/2006/main">
+  <p:cSld>
+    <p:spTree>
+      <p:nvGrpSpPr>
+        <p:cNvPr id="1" name=""/>
+        <p:cNvGrpSpPr/>
+        <p:nvPr/>
+      </p:nvGrpSpPr>
+      <p:grpSpPr>
+        <a:xfrm>
+          <a:off x="0" y="0"/>
+          <a:ext cx="0" cy="0"/>
+          <a:chOff x="0" y="0"/>
+          <a:chExt cx="0" cy="0"/>
+        </a:xfrm>
+      </p:grpSpPr>
+      <p:sp>
+        <p:nvSpPr>
+          <p:cNvPr id="2" name="Title 1">
+            <a:extLst>
+              <a:ext uri="{FF2B5EF4-FFF2-40B4-BE49-F238E27FC236}">
+                <a16:creationId xmlns:a16="http://schemas.microsoft.com/office/drawing/2014/main" id="{1662735F-2B1F-4D0C-AF2E-7A0BE04E0042}"/>
+              </a:ext>
+            </a:extLst>
+          </p:cNvPr>
+          <p:cNvSpPr>
+            <a:spLocks noGrp="1"/>
+          </p:cNvSpPr>
+          <p:nvPr>
+            <p:ph type="title"/>
+          </p:nvPr>
+        </p:nvSpPr>
+        <p:spPr/>
+        <p:txBody>
+          <a:bodyPr/>
+          <a:lstStyle/>
+          <a:p>
+            <a:r>
+              <a:rPr lang="en-GB" dirty="0"/>
+              <a:t>JSON-based queries – other queries </a:t>
+            </a:r>
+            <a:endParaRPr lang="en-NL" dirty="0"/>
+          </a:p>
+        </p:txBody>
+      </p:sp>
+      <p:sp>
+        <p:nvSpPr>
+          <p:cNvPr id="3" name="Content Placeholder 2">
+            <a:extLst>
+              <a:ext uri="{FF2B5EF4-FFF2-40B4-BE49-F238E27FC236}">
+                <a16:creationId xmlns:a16="http://schemas.microsoft.com/office/drawing/2014/main" id="{6483CDA8-7360-461B-A0CE-5F9ED7C1EF07}"/>
+              </a:ext>
+            </a:extLst>
+          </p:cNvPr>
+          <p:cNvSpPr>
+            <a:spLocks noGrp="1"/>
+          </p:cNvSpPr>
+          <p:nvPr>
+            <p:ph idx="1"/>
+          </p:nvPr>
+        </p:nvSpPr>
+        <p:spPr/>
+        <p:txBody>
+          <a:bodyPr/>
+          <a:lstStyle/>
+          <a:p>
+            <a:r>
+              <a:rPr lang="en-GB" dirty="0"/>
+              <a:t>Geo queries: query on geo points or shapes</a:t>
+            </a:r>
+          </a:p>
+          <a:p>
+            <a:r>
+              <a:rPr lang="en-GB" dirty="0"/>
+              <a:t>Shape queries: query two dimensional shapes</a:t>
+            </a:r>
+          </a:p>
+          <a:p>
+            <a:r>
+              <a:rPr lang="en-GB" dirty="0"/>
+              <a:t>Joining queries: query nested data and parent-child relationships</a:t>
+            </a:r>
+          </a:p>
+          <a:p>
+            <a:r>
+              <a:rPr lang="en-GB" dirty="0"/>
+              <a:t>span queries: low-level positional queries, very specific control over order and proximity of terms</a:t>
+            </a:r>
+          </a:p>
+          <a:p>
+            <a:r>
+              <a:rPr lang="en-GB" dirty="0"/>
+              <a:t>Specialized queries: do not fit in other groups</a:t>
+            </a:r>
+          </a:p>
+          <a:p>
+            <a:endParaRPr lang="en-GB" dirty="0"/>
+          </a:p>
+          <a:p>
+            <a:endParaRPr lang="en-GB" dirty="0"/>
+          </a:p>
+          <a:p>
+            <a:endParaRPr lang="en-GB" dirty="0"/>
+          </a:p>
+          <a:p>
+            <a:endParaRPr lang="en-GB" dirty="0"/>
+          </a:p>
+          <a:p>
+            <a:endParaRPr lang="en-GB" dirty="0"/>
+          </a:p>
+          <a:p>
+            <a:endParaRPr lang="en-GB" dirty="0"/>
+          </a:p>
+          <a:p>
+            <a:r>
+              <a:rPr lang="nl-NL" sz="1100" dirty="0">
+                <a:hlinkClick r:id="rId2"/>
+              </a:rPr>
+              <a:t>https://www.elastic.co/guide/en/elasticsearch/reference/current/query-dsl.html</a:t>
+            </a:r>
+            <a:endParaRPr lang="en-GB" sz="1100" dirty="0"/>
+          </a:p>
+        </p:txBody>
+      </p:sp>
+      <p:sp>
+        <p:nvSpPr>
+          <p:cNvPr id="4" name="Footer Placeholder 3">
+            <a:extLst>
+              <a:ext uri="{FF2B5EF4-FFF2-40B4-BE49-F238E27FC236}">
+                <a16:creationId xmlns:a16="http://schemas.microsoft.com/office/drawing/2014/main" id="{3BFE5A87-9EFF-47B0-BE3A-17205E9C81C9}"/>
+              </a:ext>
+            </a:extLst>
+          </p:cNvPr>
+          <p:cNvSpPr>
+            <a:spLocks noGrp="1"/>
+          </p:cNvSpPr>
+          <p:nvPr>
+            <p:ph type="ftr" sz="quarter" idx="11"/>
+          </p:nvPr>
+        </p:nvSpPr>
+        <p:spPr/>
+        <p:txBody>
+          <a:bodyPr/>
+          <a:lstStyle/>
+          <a:p>
+            <a:r>
+              <a:rPr lang="nl-NL"/>
+              <a:t>elasticsearch</a:t>
+            </a:r>
+          </a:p>
+        </p:txBody>
+      </p:sp>
+      <p:sp>
+        <p:nvSpPr>
+          <p:cNvPr id="5" name="Slide Number Placeholder 4">
+            <a:extLst>
+              <a:ext uri="{FF2B5EF4-FFF2-40B4-BE49-F238E27FC236}">
+                <a16:creationId xmlns:a16="http://schemas.microsoft.com/office/drawing/2014/main" id="{D6997ABD-B758-4682-8D8C-D59BDB019EF1}"/>
+              </a:ext>
+            </a:extLst>
+          </p:cNvPr>
+          <p:cNvSpPr>
+            <a:spLocks noGrp="1"/>
+          </p:cNvSpPr>
+          <p:nvPr>
+            <p:ph type="sldNum" sz="quarter" idx="12"/>
+          </p:nvPr>
+        </p:nvSpPr>
+        <p:spPr/>
+        <p:txBody>
+          <a:bodyPr/>
+          <a:lstStyle/>
+          <a:p>
+            <a:fld id="{14F1411D-0280-154F-AEAC-4C20B7AA46B2}" type="slidenum">
+              <a:rPr lang="nl-NL" smtClean="0"/>
+              <a:t>32</a:t>
+            </a:fld>
+            <a:endParaRPr lang="nl-NL"/>
+          </a:p>
+        </p:txBody>
+      </p:sp>
+    </p:spTree>
+    <p:extLst>
+      <p:ext uri="{BB962C8B-B14F-4D97-AF65-F5344CB8AC3E}">
+        <p14:creationId xmlns:p14="http://schemas.microsoft.com/office/powerpoint/2010/main" val="3384597766"/>
+      </p:ext>
+    </p:extLst>
+  </p:cSld>
+  <p:clrMapOvr>
+    <a:masterClrMapping/>
+  </p:clrMapOvr>
+</p:sld>
+</file>
+
 <file path=ppt/slides/slide33.xml><?xml version="1.0" encoding="utf-8"?>
 <p:sld xmlns:a="http://schemas.openxmlformats.org/drawingml/2006/main" xmlns:r="http://schemas.openxmlformats.org/officeDocument/2006/relationships" xmlns:p="http://schemas.openxmlformats.org/presentationml/2006/main">
   <p:cSld>
@@ -13711,201 +13731,6 @@
           <p:cNvPr id="2" name="Title 1">
             <a:extLst>
               <a:ext uri="{FF2B5EF4-FFF2-40B4-BE49-F238E27FC236}">
-                <a16:creationId xmlns:a16="http://schemas.microsoft.com/office/drawing/2014/main" id="{1662735F-2B1F-4D0C-AF2E-7A0BE04E0042}"/>
-              </a:ext>
-            </a:extLst>
-          </p:cNvPr>
-          <p:cNvSpPr>
-            <a:spLocks noGrp="1"/>
-          </p:cNvSpPr>
-          <p:nvPr>
-            <p:ph type="title"/>
-          </p:nvPr>
-        </p:nvSpPr>
-        <p:spPr/>
-        <p:txBody>
-          <a:bodyPr/>
-          <a:lstStyle/>
-          <a:p>
-            <a:r>
-              <a:rPr lang="en-GB" dirty="0"/>
-              <a:t>JSON-based queries – other queries </a:t>
-            </a:r>
-            <a:endParaRPr lang="en-NL" dirty="0"/>
-          </a:p>
-        </p:txBody>
-      </p:sp>
-      <p:sp>
-        <p:nvSpPr>
-          <p:cNvPr id="3" name="Content Placeholder 2">
-            <a:extLst>
-              <a:ext uri="{FF2B5EF4-FFF2-40B4-BE49-F238E27FC236}">
-                <a16:creationId xmlns:a16="http://schemas.microsoft.com/office/drawing/2014/main" id="{6483CDA8-7360-461B-A0CE-5F9ED7C1EF07}"/>
-              </a:ext>
-            </a:extLst>
-          </p:cNvPr>
-          <p:cNvSpPr>
-            <a:spLocks noGrp="1"/>
-          </p:cNvSpPr>
-          <p:nvPr>
-            <p:ph idx="1"/>
-          </p:nvPr>
-        </p:nvSpPr>
-        <p:spPr/>
-        <p:txBody>
-          <a:bodyPr/>
-          <a:lstStyle/>
-          <a:p>
-            <a:r>
-              <a:rPr lang="en-GB" dirty="0"/>
-              <a:t>Geo queries: query on geo points or shapes</a:t>
-            </a:r>
-          </a:p>
-          <a:p>
-            <a:r>
-              <a:rPr lang="en-GB" dirty="0"/>
-              <a:t>Shape queries: query two dimensional shapes</a:t>
-            </a:r>
-          </a:p>
-          <a:p>
-            <a:r>
-              <a:rPr lang="en-GB" dirty="0"/>
-              <a:t>Joining queries: query nested data and parent-child relationships</a:t>
-            </a:r>
-          </a:p>
-          <a:p>
-            <a:r>
-              <a:rPr lang="en-GB" dirty="0"/>
-              <a:t>span queries: low-level positional queries, very specific control over order and proximity of terms</a:t>
-            </a:r>
-          </a:p>
-          <a:p>
-            <a:r>
-              <a:rPr lang="en-GB" dirty="0"/>
-              <a:t>Specialized queries: do not fit in other groups</a:t>
-            </a:r>
-          </a:p>
-          <a:p>
-            <a:endParaRPr lang="en-GB" dirty="0"/>
-          </a:p>
-          <a:p>
-            <a:endParaRPr lang="en-GB" dirty="0"/>
-          </a:p>
-          <a:p>
-            <a:endParaRPr lang="en-GB" dirty="0"/>
-          </a:p>
-          <a:p>
-            <a:endParaRPr lang="en-GB" dirty="0"/>
-          </a:p>
-          <a:p>
-            <a:endParaRPr lang="en-GB" dirty="0"/>
-          </a:p>
-          <a:p>
-            <a:endParaRPr lang="en-GB" dirty="0"/>
-          </a:p>
-          <a:p>
-            <a:r>
-              <a:rPr lang="nl-NL" sz="1100" dirty="0">
-                <a:hlinkClick r:id="rId2"/>
-              </a:rPr>
-              <a:t>https://www.elastic.co/guide/en/elasticsearch/reference/current/query-dsl.html</a:t>
-            </a:r>
-            <a:endParaRPr lang="en-GB" sz="1100" dirty="0"/>
-          </a:p>
-        </p:txBody>
-      </p:sp>
-      <p:sp>
-        <p:nvSpPr>
-          <p:cNvPr id="4" name="Footer Placeholder 3">
-            <a:extLst>
-              <a:ext uri="{FF2B5EF4-FFF2-40B4-BE49-F238E27FC236}">
-                <a16:creationId xmlns:a16="http://schemas.microsoft.com/office/drawing/2014/main" id="{3BFE5A87-9EFF-47B0-BE3A-17205E9C81C9}"/>
-              </a:ext>
-            </a:extLst>
-          </p:cNvPr>
-          <p:cNvSpPr>
-            <a:spLocks noGrp="1"/>
-          </p:cNvSpPr>
-          <p:nvPr>
-            <p:ph type="ftr" sz="quarter" idx="11"/>
-          </p:nvPr>
-        </p:nvSpPr>
-        <p:spPr/>
-        <p:txBody>
-          <a:bodyPr/>
-          <a:lstStyle/>
-          <a:p>
-            <a:r>
-              <a:rPr lang="nl-NL"/>
-              <a:t>elasticsearch</a:t>
-            </a:r>
-          </a:p>
-        </p:txBody>
-      </p:sp>
-      <p:sp>
-        <p:nvSpPr>
-          <p:cNvPr id="5" name="Slide Number Placeholder 4">
-            <a:extLst>
-              <a:ext uri="{FF2B5EF4-FFF2-40B4-BE49-F238E27FC236}">
-                <a16:creationId xmlns:a16="http://schemas.microsoft.com/office/drawing/2014/main" id="{D6997ABD-B758-4682-8D8C-D59BDB019EF1}"/>
-              </a:ext>
-            </a:extLst>
-          </p:cNvPr>
-          <p:cNvSpPr>
-            <a:spLocks noGrp="1"/>
-          </p:cNvSpPr>
-          <p:nvPr>
-            <p:ph type="sldNum" sz="quarter" idx="12"/>
-          </p:nvPr>
-        </p:nvSpPr>
-        <p:spPr/>
-        <p:txBody>
-          <a:bodyPr/>
-          <a:lstStyle/>
-          <a:p>
-            <a:fld id="{14F1411D-0280-154F-AEAC-4C20B7AA46B2}" type="slidenum">
-              <a:rPr lang="nl-NL" smtClean="0"/>
-              <a:t>33</a:t>
-            </a:fld>
-            <a:endParaRPr lang="nl-NL"/>
-          </a:p>
-        </p:txBody>
-      </p:sp>
-    </p:spTree>
-    <p:extLst>
-      <p:ext uri="{BB962C8B-B14F-4D97-AF65-F5344CB8AC3E}">
-        <p14:creationId xmlns:p14="http://schemas.microsoft.com/office/powerpoint/2010/main" val="3384597766"/>
-      </p:ext>
-    </p:extLst>
-  </p:cSld>
-  <p:clrMapOvr>
-    <a:masterClrMapping/>
-  </p:clrMapOvr>
-</p:sld>
-</file>
-
-<file path=ppt/slides/slide34.xml><?xml version="1.0" encoding="utf-8"?>
-<p:sld xmlns:a="http://schemas.openxmlformats.org/drawingml/2006/main" xmlns:r="http://schemas.openxmlformats.org/officeDocument/2006/relationships" xmlns:p="http://schemas.openxmlformats.org/presentationml/2006/main">
-  <p:cSld>
-    <p:spTree>
-      <p:nvGrpSpPr>
-        <p:cNvPr id="1" name=""/>
-        <p:cNvGrpSpPr/>
-        <p:nvPr/>
-      </p:nvGrpSpPr>
-      <p:grpSpPr>
-        <a:xfrm>
-          <a:off x="0" y="0"/>
-          <a:ext cx="0" cy="0"/>
-          <a:chOff x="0" y="0"/>
-          <a:chExt cx="0" cy="0"/>
-        </a:xfrm>
-      </p:grpSpPr>
-      <p:sp>
-        <p:nvSpPr>
-          <p:cNvPr id="2" name="Title 1">
-            <a:extLst>
-              <a:ext uri="{FF2B5EF4-FFF2-40B4-BE49-F238E27FC236}">
                 <a16:creationId xmlns:a16="http://schemas.microsoft.com/office/drawing/2014/main" id="{59E25428-E79C-49D8-A2C4-6BEF87511F34}"/>
               </a:ext>
             </a:extLst>
@@ -14012,7 +13837,7 @@
           <a:p>
             <a:fld id="{14F1411D-0280-154F-AEAC-4C20B7AA46B2}" type="slidenum">
               <a:rPr lang="nl-NL" smtClean="0"/>
-              <a:t>34</a:t>
+              <a:t>33</a:t>
             </a:fld>
             <a:endParaRPr lang="nl-NL"/>
           </a:p>
@@ -14314,6 +14139,237 @@
 </p:sld>
 </file>
 
+<file path=ppt/slides/slide34.xml><?xml version="1.0" encoding="utf-8"?>
+<p:sld xmlns:a="http://schemas.openxmlformats.org/drawingml/2006/main" xmlns:r="http://schemas.openxmlformats.org/officeDocument/2006/relationships" xmlns:p="http://schemas.openxmlformats.org/presentationml/2006/main">
+  <p:cSld>
+    <p:spTree>
+      <p:nvGrpSpPr>
+        <p:cNvPr id="1" name=""/>
+        <p:cNvGrpSpPr/>
+        <p:nvPr/>
+      </p:nvGrpSpPr>
+      <p:grpSpPr>
+        <a:xfrm>
+          <a:off x="0" y="0"/>
+          <a:ext cx="0" cy="0"/>
+          <a:chOff x="0" y="0"/>
+          <a:chExt cx="0" cy="0"/>
+        </a:xfrm>
+      </p:grpSpPr>
+      <p:sp>
+        <p:nvSpPr>
+          <p:cNvPr id="2" name="Title 1">
+            <a:extLst>
+              <a:ext uri="{FF2B5EF4-FFF2-40B4-BE49-F238E27FC236}">
+                <a16:creationId xmlns:a16="http://schemas.microsoft.com/office/drawing/2014/main" id="{8602A742-0C15-489F-9A77-2ECA0F11429F}"/>
+              </a:ext>
+            </a:extLst>
+          </p:cNvPr>
+          <p:cNvSpPr>
+            <a:spLocks noGrp="1"/>
+          </p:cNvSpPr>
+          <p:nvPr>
+            <p:ph type="title"/>
+          </p:nvPr>
+        </p:nvSpPr>
+        <p:spPr/>
+        <p:txBody>
+          <a:bodyPr/>
+          <a:lstStyle/>
+          <a:p>
+            <a:r>
+              <a:rPr lang="en-GB" dirty="0"/>
+              <a:t>Scoring</a:t>
+            </a:r>
+            <a:endParaRPr lang="en-NL" dirty="0"/>
+          </a:p>
+        </p:txBody>
+      </p:sp>
+      <p:sp>
+        <p:nvSpPr>
+          <p:cNvPr id="3" name="Content Placeholder 2">
+            <a:extLst>
+              <a:ext uri="{FF2B5EF4-FFF2-40B4-BE49-F238E27FC236}">
+                <a16:creationId xmlns:a16="http://schemas.microsoft.com/office/drawing/2014/main" id="{6D38AB44-3548-461E-8441-ECD089D829F1}"/>
+              </a:ext>
+            </a:extLst>
+          </p:cNvPr>
+          <p:cNvSpPr>
+            <a:spLocks noGrp="1"/>
+          </p:cNvSpPr>
+          <p:nvPr>
+            <p:ph idx="1"/>
+          </p:nvPr>
+        </p:nvSpPr>
+        <p:spPr/>
+        <p:txBody>
+          <a:bodyPr/>
+          <a:lstStyle/>
+          <a:p>
+            <a:r>
+              <a:rPr lang="en-GB" dirty="0"/>
+              <a:t>The score indicates the relevance of a result</a:t>
+            </a:r>
+          </a:p>
+          <a:p>
+            <a:r>
+              <a:rPr lang="en-GB" dirty="0"/>
+              <a:t>Default scoring: how often a term occurs in the document (term frequency or TF) compared to how often it occurs in all documents (inverse document frequency or IDF)</a:t>
+            </a:r>
+          </a:p>
+          <a:p>
+            <a:r>
+              <a:rPr lang="en-GB" dirty="0"/>
+              <a:t>Can use other scoring method for whole cluster or for just one field</a:t>
+            </a:r>
+          </a:p>
+          <a:p>
+            <a:endParaRPr lang="en-GB" dirty="0"/>
+          </a:p>
+          <a:p>
+            <a:r>
+              <a:rPr lang="en-GB" dirty="0"/>
+              <a:t>Rescoring: resource intensive scoring calculations</a:t>
+            </a:r>
+          </a:p>
+          <a:p>
+            <a:pPr lvl="1"/>
+            <a:r>
+              <a:rPr lang="en-GB" dirty="0"/>
+              <a:t>Only applied to top results, after initial scoring is done</a:t>
+            </a:r>
+          </a:p>
+          <a:p>
+            <a:pPr lvl="1"/>
+            <a:r>
+              <a:rPr lang="en-GB" dirty="0"/>
+              <a:t>Add “rescore” to JSON body with </a:t>
+            </a:r>
+            <a:r>
+              <a:rPr lang="en-GB" dirty="0" err="1"/>
+              <a:t>window_size</a:t>
+            </a:r>
+            <a:r>
+              <a:rPr lang="en-GB" dirty="0"/>
+              <a:t>, query, </a:t>
+            </a:r>
+            <a:r>
+              <a:rPr lang="en-GB" dirty="0" err="1"/>
+              <a:t>query_weight</a:t>
+            </a:r>
+            <a:r>
+              <a:rPr lang="en-GB" dirty="0"/>
+              <a:t> and </a:t>
+            </a:r>
+            <a:r>
+              <a:rPr lang="en-GB" dirty="0" err="1"/>
+              <a:t>rescore_weight</a:t>
+            </a:r>
+            <a:endParaRPr lang="en-GB" dirty="0"/>
+          </a:p>
+          <a:p>
+            <a:pPr lvl="2"/>
+            <a:r>
+              <a:rPr lang="en-GB" sz="1400" dirty="0"/>
+              <a:t>Window size determines on how many of the top documents a rescore is applied</a:t>
+            </a:r>
+          </a:p>
+          <a:p>
+            <a:pPr lvl="2"/>
+            <a:r>
+              <a:rPr lang="en-GB" sz="1400" dirty="0"/>
+              <a:t>The relative importance of the original score and rescore can be controller with </a:t>
+            </a:r>
+            <a:r>
+              <a:rPr lang="en-GB" sz="1400" dirty="0" err="1"/>
+              <a:t>query_weight</a:t>
+            </a:r>
+            <a:r>
+              <a:rPr lang="en-GB" sz="1400" dirty="0"/>
+              <a:t> and </a:t>
+            </a:r>
+            <a:r>
+              <a:rPr lang="en-GB" sz="1400" dirty="0" err="1"/>
+              <a:t>rescore_weight</a:t>
+            </a:r>
+            <a:endParaRPr lang="en-NL" sz="1400" dirty="0"/>
+          </a:p>
+          <a:p>
+            <a:pPr lvl="1"/>
+            <a:endParaRPr lang="en-GB" dirty="0"/>
+          </a:p>
+        </p:txBody>
+      </p:sp>
+      <p:sp>
+        <p:nvSpPr>
+          <p:cNvPr id="4" name="Footer Placeholder 3">
+            <a:extLst>
+              <a:ext uri="{FF2B5EF4-FFF2-40B4-BE49-F238E27FC236}">
+                <a16:creationId xmlns:a16="http://schemas.microsoft.com/office/drawing/2014/main" id="{91853CB0-BCD0-4B16-9D4D-9ECAA1C9E561}"/>
+              </a:ext>
+            </a:extLst>
+          </p:cNvPr>
+          <p:cNvSpPr>
+            <a:spLocks noGrp="1"/>
+          </p:cNvSpPr>
+          <p:nvPr>
+            <p:ph type="ftr" sz="quarter" idx="11"/>
+          </p:nvPr>
+        </p:nvSpPr>
+        <p:spPr/>
+        <p:txBody>
+          <a:bodyPr/>
+          <a:lstStyle/>
+          <a:p>
+            <a:r>
+              <a:rPr lang="nl-NL"/>
+              <a:t>elasticsearch</a:t>
+            </a:r>
+          </a:p>
+        </p:txBody>
+      </p:sp>
+      <p:sp>
+        <p:nvSpPr>
+          <p:cNvPr id="5" name="Slide Number Placeholder 4">
+            <a:extLst>
+              <a:ext uri="{FF2B5EF4-FFF2-40B4-BE49-F238E27FC236}">
+                <a16:creationId xmlns:a16="http://schemas.microsoft.com/office/drawing/2014/main" id="{1ED320EF-EAEE-489F-A386-BA38AB71ECE2}"/>
+              </a:ext>
+            </a:extLst>
+          </p:cNvPr>
+          <p:cNvSpPr>
+            <a:spLocks noGrp="1"/>
+          </p:cNvSpPr>
+          <p:nvPr>
+            <p:ph type="sldNum" sz="quarter" idx="12"/>
+          </p:nvPr>
+        </p:nvSpPr>
+        <p:spPr/>
+        <p:txBody>
+          <a:bodyPr/>
+          <a:lstStyle/>
+          <a:p>
+            <a:fld id="{14F1411D-0280-154F-AEAC-4C20B7AA46B2}" type="slidenum">
+              <a:rPr lang="nl-NL" smtClean="0"/>
+              <a:t>34</a:t>
+            </a:fld>
+            <a:endParaRPr lang="nl-NL"/>
+          </a:p>
+        </p:txBody>
+      </p:sp>
+    </p:spTree>
+    <p:extLst>
+      <p:ext uri="{BB962C8B-B14F-4D97-AF65-F5344CB8AC3E}">
+        <p14:creationId xmlns:p14="http://schemas.microsoft.com/office/powerpoint/2010/main" val="2815328155"/>
+      </p:ext>
+    </p:extLst>
+  </p:cSld>
+  <p:clrMapOvr>
+    <a:masterClrMapping/>
+  </p:clrMapOvr>
+</p:sld>
+</file>
+
 <file path=ppt/slides/slide35.xml><?xml version="1.0" encoding="utf-8"?>
 <p:sld xmlns:a="http://schemas.openxmlformats.org/drawingml/2006/main" xmlns:r="http://schemas.openxmlformats.org/officeDocument/2006/relationships" xmlns:p="http://schemas.openxmlformats.org/presentationml/2006/main">
   <p:cSld>
@@ -14336,7 +14392,7 @@
           <p:cNvPr id="2" name="Title 1">
             <a:extLst>
               <a:ext uri="{FF2B5EF4-FFF2-40B4-BE49-F238E27FC236}">
-                <a16:creationId xmlns:a16="http://schemas.microsoft.com/office/drawing/2014/main" id="{8602A742-0C15-489F-9A77-2ECA0F11429F}"/>
+                <a16:creationId xmlns:a16="http://schemas.microsoft.com/office/drawing/2014/main" id="{0C661C5B-F171-4F19-B641-29A0C774C0EA}"/>
               </a:ext>
             </a:extLst>
           </p:cNvPr>
@@ -14354,7 +14410,7 @@
           <a:p>
             <a:r>
               <a:rPr lang="en-GB" dirty="0"/>
-              <a:t>Scoring</a:t>
+              <a:t>Boosting(1)</a:t>
             </a:r>
             <a:endParaRPr lang="en-NL" dirty="0"/>
           </a:p>
@@ -14365,7 +14421,7 @@
           <p:cNvPr id="3" name="Content Placeholder 2">
             <a:extLst>
               <a:ext uri="{FF2B5EF4-FFF2-40B4-BE49-F238E27FC236}">
-                <a16:creationId xmlns:a16="http://schemas.microsoft.com/office/drawing/2014/main" id="{6D38AB44-3548-461E-8441-ECD089D829F1}"/>
+                <a16:creationId xmlns:a16="http://schemas.microsoft.com/office/drawing/2014/main" id="{025E9466-CE9D-445D-AC79-0BE72AF44377}"/>
               </a:ext>
             </a:extLst>
           </p:cNvPr>
@@ -14383,95 +14439,65 @@
           <a:p>
             <a:r>
               <a:rPr lang="en-GB" dirty="0"/>
-              <a:t>The score indicates the relevance of a result</a:t>
+              <a:t>Boosting: change relevance (score) of documents</a:t>
+            </a:r>
+          </a:p>
+          <a:p>
+            <a:pPr lvl="1"/>
+            <a:r>
+              <a:rPr lang="en-GB" sz="1400" dirty="0"/>
+              <a:t>When indexing (deprecated): can only be altered by re-indexing </a:t>
+            </a:r>
+          </a:p>
+          <a:p>
+            <a:pPr lvl="1"/>
+            <a:r>
+              <a:rPr lang="en-GB" sz="1400" dirty="0"/>
+              <a:t>When querying</a:t>
             </a:r>
           </a:p>
           <a:p>
             <a:r>
               <a:rPr lang="en-GB" dirty="0"/>
-              <a:t>Default scoring: how often a term occurs in the document (term frequency or TF) compared to how often it occurs in all documents (inverse document frequency or IDF)</a:t>
+              <a:t>Boosting is relative</a:t>
             </a:r>
           </a:p>
           <a:p>
             <a:r>
               <a:rPr lang="en-GB" dirty="0"/>
-              <a:t>Can use other scoring method for whole cluster or for just one field</a:t>
-            </a:r>
-          </a:p>
-          <a:p>
-            <a:endParaRPr lang="en-GB" dirty="0"/>
-          </a:p>
-          <a:p>
-            <a:r>
-              <a:rPr lang="en-GB" dirty="0"/>
-              <a:t>Rescoring: resource intensive scoring calculations</a:t>
+              <a:t>By adding </a:t>
+            </a:r>
+            <a:r>
+              <a:rPr lang="nl-NL" dirty="0"/>
+              <a:t>“explain”: true to a query an _explanation is added to the result where the TF and IDF and boosting factors can be found</a:t>
             </a:r>
           </a:p>
           <a:p>
             <a:pPr lvl="1"/>
             <a:r>
-              <a:rPr lang="en-GB" dirty="0"/>
-              <a:t>Only applied to top results, after initial scoring is done</a:t>
+              <a:rPr lang="nl-NL" sz="1400" dirty="0"/>
+              <a:t>Resource intensive, use only for debugging</a:t>
+            </a:r>
+          </a:p>
+          <a:p>
+            <a:endParaRPr lang="nl-NL" dirty="0"/>
+          </a:p>
+          <a:p>
+            <a:r>
+              <a:rPr lang="nl-NL" dirty="0"/>
+              <a:t>Can be done in most term-level and full-text queries and all compound queries</a:t>
             </a:r>
           </a:p>
           <a:p>
             <a:pPr lvl="1"/>
             <a:r>
-              <a:rPr lang="en-GB" dirty="0"/>
-              <a:t>Add “rescore” to JSON body with </a:t>
-            </a:r>
-            <a:r>
-              <a:rPr lang="en-GB" dirty="0" err="1"/>
-              <a:t>window_size</a:t>
-            </a:r>
-            <a:r>
-              <a:rPr lang="en-GB" dirty="0"/>
-              <a:t>, query, </a:t>
-            </a:r>
-            <a:r>
-              <a:rPr lang="en-GB" dirty="0" err="1"/>
-              <a:t>query_weight</a:t>
-            </a:r>
-            <a:r>
-              <a:rPr lang="en-GB" dirty="0"/>
-              <a:t> and </a:t>
-            </a:r>
-            <a:r>
-              <a:rPr lang="en-GB" dirty="0" err="1"/>
-              <a:t>rescore_weight</a:t>
-            </a:r>
-            <a:endParaRPr lang="en-GB" dirty="0"/>
-          </a:p>
-          <a:p>
-            <a:pPr lvl="2"/>
-            <a:r>
-              <a:rPr lang="en-GB" sz="1400" dirty="0"/>
-              <a:t>Window size determines on how many of the top documents a rescore is applied</a:t>
-            </a:r>
-          </a:p>
-          <a:p>
-            <a:pPr lvl="2"/>
-            <a:r>
-              <a:rPr lang="en-GB" sz="1400" dirty="0"/>
-              <a:t>The relative importance of the original score and rescore can be controller with </a:t>
-            </a:r>
-            <a:r>
-              <a:rPr lang="en-GB" sz="1400" dirty="0" err="1"/>
-              <a:t>query_weight</a:t>
-            </a:r>
-            <a:r>
-              <a:rPr lang="en-GB" sz="1400" dirty="0"/>
-              <a:t> and </a:t>
-            </a:r>
-            <a:r>
-              <a:rPr lang="en-GB" sz="1400" dirty="0" err="1"/>
-              <a:t>rescore_weight</a:t>
-            </a:r>
-            <a:endParaRPr lang="en-NL" sz="1400" dirty="0"/>
-          </a:p>
-          <a:p>
-            <a:pPr lvl="1"/>
-            <a:endParaRPr lang="en-GB" dirty="0"/>
+              <a:rPr lang="nl-NL" sz="1400" dirty="0"/>
+              <a:t>Only relevant when combining queries or searching multiple fields</a:t>
+            </a:r>
+            <a:endParaRPr lang="en-GB" sz="1400" dirty="0"/>
+          </a:p>
+          <a:p>
+            <a:endParaRPr lang="en-NL" dirty="0"/>
           </a:p>
         </p:txBody>
       </p:sp>
@@ -14480,7 +14506,7 @@
           <p:cNvPr id="4" name="Footer Placeholder 3">
             <a:extLst>
               <a:ext uri="{FF2B5EF4-FFF2-40B4-BE49-F238E27FC236}">
-                <a16:creationId xmlns:a16="http://schemas.microsoft.com/office/drawing/2014/main" id="{91853CB0-BCD0-4B16-9D4D-9ECAA1C9E561}"/>
+                <a16:creationId xmlns:a16="http://schemas.microsoft.com/office/drawing/2014/main" id="{3F21F476-6764-4B0D-8AB6-FBFF16A8E2B1}"/>
               </a:ext>
             </a:extLst>
           </p:cNvPr>
@@ -14508,7 +14534,7 @@
           <p:cNvPr id="5" name="Slide Number Placeholder 4">
             <a:extLst>
               <a:ext uri="{FF2B5EF4-FFF2-40B4-BE49-F238E27FC236}">
-                <a16:creationId xmlns:a16="http://schemas.microsoft.com/office/drawing/2014/main" id="{1ED320EF-EAEE-489F-A386-BA38AB71ECE2}"/>
+                <a16:creationId xmlns:a16="http://schemas.microsoft.com/office/drawing/2014/main" id="{356553CF-D343-4477-9A21-25B90ECD052F}"/>
               </a:ext>
             </a:extLst>
           </p:cNvPr>
@@ -14535,7 +14561,7 @@
     </p:spTree>
     <p:extLst>
       <p:ext uri="{BB962C8B-B14F-4D97-AF65-F5344CB8AC3E}">
-        <p14:creationId xmlns:p14="http://schemas.microsoft.com/office/powerpoint/2010/main" val="2815328155"/>
+        <p14:creationId xmlns:p14="http://schemas.microsoft.com/office/powerpoint/2010/main" val="2772075307"/>
       </p:ext>
     </p:extLst>
   </p:cSld>
@@ -14567,7 +14593,7 @@
           <p:cNvPr id="2" name="Title 1">
             <a:extLst>
               <a:ext uri="{FF2B5EF4-FFF2-40B4-BE49-F238E27FC236}">
-                <a16:creationId xmlns:a16="http://schemas.microsoft.com/office/drawing/2014/main" id="{0C661C5B-F171-4F19-B641-29A0C774C0EA}"/>
+                <a16:creationId xmlns:a16="http://schemas.microsoft.com/office/drawing/2014/main" id="{55A1B8A9-4134-4893-B9C3-DBC4CA9A639C}"/>
               </a:ext>
             </a:extLst>
           </p:cNvPr>
@@ -14585,103 +14611,49 @@
           <a:p>
             <a:r>
               <a:rPr lang="en-GB" dirty="0"/>
-              <a:t>Boosting(1)</a:t>
+              <a:t>Boosting(2)</a:t>
             </a:r>
             <a:endParaRPr lang="en-NL" dirty="0"/>
           </a:p>
         </p:txBody>
       </p:sp>
-      <p:sp>
-        <p:nvSpPr>
-          <p:cNvPr id="3" name="Content Placeholder 2">
+      <p:pic>
+        <p:nvPicPr>
+          <p:cNvPr id="7" name="Content Placeholder 6">
             <a:extLst>
               <a:ext uri="{FF2B5EF4-FFF2-40B4-BE49-F238E27FC236}">
-                <a16:creationId xmlns:a16="http://schemas.microsoft.com/office/drawing/2014/main" id="{025E9466-CE9D-445D-AC79-0BE72AF44377}"/>
+                <a16:creationId xmlns:a16="http://schemas.microsoft.com/office/drawing/2014/main" id="{9F6A3342-4366-416A-A010-A71799ADF02A}"/>
+              </a:ext>
+              <a:ext uri="{C183D7F6-B498-43B3-948B-1728B52AA6E4}">
+                <adec:decorative xmlns:adec="http://schemas.microsoft.com/office/drawing/2017/decorative" val="1"/>
               </a:ext>
             </a:extLst>
           </p:cNvPr>
-          <p:cNvSpPr>
-            <a:spLocks noGrp="1"/>
-          </p:cNvSpPr>
+          <p:cNvPicPr>
+            <a:picLocks noGrp="1" noChangeAspect="1"/>
+          </p:cNvPicPr>
           <p:nvPr>
             <p:ph idx="1"/>
           </p:nvPr>
-        </p:nvSpPr>
-        <p:spPr/>
-        <p:txBody>
-          <a:bodyPr/>
-          <a:lstStyle/>
-          <a:p>
-            <a:r>
-              <a:rPr lang="en-GB" dirty="0"/>
-              <a:t>Boosting: change relevance (score) of documents</a:t>
-            </a:r>
-          </a:p>
-          <a:p>
-            <a:pPr lvl="1"/>
-            <a:r>
-              <a:rPr lang="en-GB" sz="1400" dirty="0"/>
-              <a:t>When indexing (deprecated): can only be altered by re-indexing </a:t>
-            </a:r>
-          </a:p>
-          <a:p>
-            <a:pPr lvl="1"/>
-            <a:r>
-              <a:rPr lang="en-GB" sz="1400" dirty="0"/>
-              <a:t>When querying</a:t>
-            </a:r>
-          </a:p>
-          <a:p>
-            <a:r>
-              <a:rPr lang="en-GB" dirty="0"/>
-              <a:t>Boosting is relative</a:t>
-            </a:r>
-          </a:p>
-          <a:p>
-            <a:r>
-              <a:rPr lang="en-GB" dirty="0"/>
-              <a:t>By adding </a:t>
-            </a:r>
-            <a:r>
-              <a:rPr lang="nl-NL" dirty="0"/>
-              <a:t>“explain”: true to a query an _explanation is added to the result where the TF and IDF and boosting factors can be found</a:t>
-            </a:r>
-          </a:p>
-          <a:p>
-            <a:pPr lvl="1"/>
-            <a:r>
-              <a:rPr lang="nl-NL" sz="1400" dirty="0"/>
-              <a:t>Resource intensive, use only for debugging</a:t>
-            </a:r>
-          </a:p>
-          <a:p>
-            <a:endParaRPr lang="nl-NL" dirty="0"/>
-          </a:p>
-          <a:p>
-            <a:r>
-              <a:rPr lang="nl-NL" dirty="0"/>
-              <a:t>Can be done in most term-level and full-text queries and all compound queries</a:t>
-            </a:r>
-          </a:p>
-          <a:p>
-            <a:pPr lvl="1"/>
-            <a:r>
-              <a:rPr lang="nl-NL" sz="1400" dirty="0"/>
-              <a:t>Only relevant when combining queries or searching multiple fields</a:t>
-            </a:r>
-            <a:endParaRPr lang="en-GB" sz="1400" dirty="0"/>
-          </a:p>
-          <a:p>
-            <a:endParaRPr lang="en-NL" dirty="0"/>
-          </a:p>
-        </p:txBody>
-      </p:sp>
+        </p:nvPicPr>
+        <p:blipFill rotWithShape="1">
+          <a:blip r:embed="rId2"/>
+          <a:srcRect t="3330" r="24450" b="2670"/>
+          <a:stretch/>
+        </p:blipFill>
+        <p:spPr>
+          <a:xfrm>
+            <a:off x="719999" y="975360"/>
+            <a:ext cx="4454352" cy="3553098"/>
+          </a:xfrm>
+        </p:spPr>
+      </p:pic>
       <p:sp>
         <p:nvSpPr>
           <p:cNvPr id="4" name="Footer Placeholder 3">
             <a:extLst>
               <a:ext uri="{FF2B5EF4-FFF2-40B4-BE49-F238E27FC236}">
-                <a16:creationId xmlns:a16="http://schemas.microsoft.com/office/drawing/2014/main" id="{3F21F476-6764-4B0D-8AB6-FBFF16A8E2B1}"/>
+                <a16:creationId xmlns:a16="http://schemas.microsoft.com/office/drawing/2014/main" id="{2BF3F9E7-7E86-444B-A68A-F81792B95DFF}"/>
               </a:ext>
             </a:extLst>
           </p:cNvPr>
@@ -14709,7 +14681,7 @@
           <p:cNvPr id="5" name="Slide Number Placeholder 4">
             <a:extLst>
               <a:ext uri="{FF2B5EF4-FFF2-40B4-BE49-F238E27FC236}">
-                <a16:creationId xmlns:a16="http://schemas.microsoft.com/office/drawing/2014/main" id="{356553CF-D343-4477-9A21-25B90ECD052F}"/>
+                <a16:creationId xmlns:a16="http://schemas.microsoft.com/office/drawing/2014/main" id="{4AD1042B-6ED7-46E1-858B-6E374DFF8BEF}"/>
               </a:ext>
             </a:extLst>
           </p:cNvPr>
@@ -14736,7 +14708,7 @@
     </p:spTree>
     <p:extLst>
       <p:ext uri="{BB962C8B-B14F-4D97-AF65-F5344CB8AC3E}">
-        <p14:creationId xmlns:p14="http://schemas.microsoft.com/office/powerpoint/2010/main" val="2772075307"/>
+        <p14:creationId xmlns:p14="http://schemas.microsoft.com/office/powerpoint/2010/main" val="4294700896"/>
       </p:ext>
     </p:extLst>
   </p:cSld>
@@ -14768,153 +14740,6 @@
           <p:cNvPr id="2" name="Title 1">
             <a:extLst>
               <a:ext uri="{FF2B5EF4-FFF2-40B4-BE49-F238E27FC236}">
-                <a16:creationId xmlns:a16="http://schemas.microsoft.com/office/drawing/2014/main" id="{55A1B8A9-4134-4893-B9C3-DBC4CA9A639C}"/>
-              </a:ext>
-            </a:extLst>
-          </p:cNvPr>
-          <p:cNvSpPr>
-            <a:spLocks noGrp="1"/>
-          </p:cNvSpPr>
-          <p:nvPr>
-            <p:ph type="title"/>
-          </p:nvPr>
-        </p:nvSpPr>
-        <p:spPr/>
-        <p:txBody>
-          <a:bodyPr/>
-          <a:lstStyle/>
-          <a:p>
-            <a:r>
-              <a:rPr lang="en-GB" dirty="0"/>
-              <a:t>Boosting(2)</a:t>
-            </a:r>
-            <a:endParaRPr lang="en-NL" dirty="0"/>
-          </a:p>
-        </p:txBody>
-      </p:sp>
-      <p:pic>
-        <p:nvPicPr>
-          <p:cNvPr id="7" name="Content Placeholder 6">
-            <a:extLst>
-              <a:ext uri="{FF2B5EF4-FFF2-40B4-BE49-F238E27FC236}">
-                <a16:creationId xmlns:a16="http://schemas.microsoft.com/office/drawing/2014/main" id="{9F6A3342-4366-416A-A010-A71799ADF02A}"/>
-              </a:ext>
-              <a:ext uri="{C183D7F6-B498-43B3-948B-1728B52AA6E4}">
-                <adec:decorative xmlns:adec="http://schemas.microsoft.com/office/drawing/2017/decorative" val="1"/>
-              </a:ext>
-            </a:extLst>
-          </p:cNvPr>
-          <p:cNvPicPr>
-            <a:picLocks noGrp="1" noChangeAspect="1"/>
-          </p:cNvPicPr>
-          <p:nvPr>
-            <p:ph idx="1"/>
-          </p:nvPr>
-        </p:nvPicPr>
-        <p:blipFill rotWithShape="1">
-          <a:blip r:embed="rId2"/>
-          <a:srcRect t="3330" r="24450" b="2670"/>
-          <a:stretch/>
-        </p:blipFill>
-        <p:spPr>
-          <a:xfrm>
-            <a:off x="719999" y="975360"/>
-            <a:ext cx="4454352" cy="3553098"/>
-          </a:xfrm>
-        </p:spPr>
-      </p:pic>
-      <p:sp>
-        <p:nvSpPr>
-          <p:cNvPr id="4" name="Footer Placeholder 3">
-            <a:extLst>
-              <a:ext uri="{FF2B5EF4-FFF2-40B4-BE49-F238E27FC236}">
-                <a16:creationId xmlns:a16="http://schemas.microsoft.com/office/drawing/2014/main" id="{2BF3F9E7-7E86-444B-A68A-F81792B95DFF}"/>
-              </a:ext>
-            </a:extLst>
-          </p:cNvPr>
-          <p:cNvSpPr>
-            <a:spLocks noGrp="1"/>
-          </p:cNvSpPr>
-          <p:nvPr>
-            <p:ph type="ftr" sz="quarter" idx="11"/>
-          </p:nvPr>
-        </p:nvSpPr>
-        <p:spPr/>
-        <p:txBody>
-          <a:bodyPr/>
-          <a:lstStyle/>
-          <a:p>
-            <a:r>
-              <a:rPr lang="nl-NL"/>
-              <a:t>elasticsearch</a:t>
-            </a:r>
-          </a:p>
-        </p:txBody>
-      </p:sp>
-      <p:sp>
-        <p:nvSpPr>
-          <p:cNvPr id="5" name="Slide Number Placeholder 4">
-            <a:extLst>
-              <a:ext uri="{FF2B5EF4-FFF2-40B4-BE49-F238E27FC236}">
-                <a16:creationId xmlns:a16="http://schemas.microsoft.com/office/drawing/2014/main" id="{4AD1042B-6ED7-46E1-858B-6E374DFF8BEF}"/>
-              </a:ext>
-            </a:extLst>
-          </p:cNvPr>
-          <p:cNvSpPr>
-            <a:spLocks noGrp="1"/>
-          </p:cNvSpPr>
-          <p:nvPr>
-            <p:ph type="sldNum" sz="quarter" idx="12"/>
-          </p:nvPr>
-        </p:nvSpPr>
-        <p:spPr/>
-        <p:txBody>
-          <a:bodyPr/>
-          <a:lstStyle/>
-          <a:p>
-            <a:fld id="{14F1411D-0280-154F-AEAC-4C20B7AA46B2}" type="slidenum">
-              <a:rPr lang="nl-NL" smtClean="0"/>
-              <a:t>37</a:t>
-            </a:fld>
-            <a:endParaRPr lang="nl-NL"/>
-          </a:p>
-        </p:txBody>
-      </p:sp>
-    </p:spTree>
-    <p:extLst>
-      <p:ext uri="{BB962C8B-B14F-4D97-AF65-F5344CB8AC3E}">
-        <p14:creationId xmlns:p14="http://schemas.microsoft.com/office/powerpoint/2010/main" val="4294700896"/>
-      </p:ext>
-    </p:extLst>
-  </p:cSld>
-  <p:clrMapOvr>
-    <a:masterClrMapping/>
-  </p:clrMapOvr>
-</p:sld>
-</file>
-
-<file path=ppt/slides/slide38.xml><?xml version="1.0" encoding="utf-8"?>
-<p:sld xmlns:a="http://schemas.openxmlformats.org/drawingml/2006/main" xmlns:r="http://schemas.openxmlformats.org/officeDocument/2006/relationships" xmlns:p="http://schemas.openxmlformats.org/presentationml/2006/main">
-  <p:cSld>
-    <p:spTree>
-      <p:nvGrpSpPr>
-        <p:cNvPr id="1" name=""/>
-        <p:cNvGrpSpPr/>
-        <p:nvPr/>
-      </p:nvGrpSpPr>
-      <p:grpSpPr>
-        <a:xfrm>
-          <a:off x="0" y="0"/>
-          <a:ext cx="0" cy="0"/>
-          <a:chOff x="0" y="0"/>
-          <a:chExt cx="0" cy="0"/>
-        </a:xfrm>
-      </p:grpSpPr>
-      <p:sp>
-        <p:nvSpPr>
-          <p:cNvPr id="2" name="Title 1">
-            <a:extLst>
-              <a:ext uri="{FF2B5EF4-FFF2-40B4-BE49-F238E27FC236}">
                 <a16:creationId xmlns:a16="http://schemas.microsoft.com/office/drawing/2014/main" id="{2F06F964-04B2-41AD-BD1A-F7ECBD43EA37}"/>
               </a:ext>
             </a:extLst>
@@ -15109,7 +14934,7 @@
           <a:p>
             <a:fld id="{14F1411D-0280-154F-AEAC-4C20B7AA46B2}" type="slidenum">
               <a:rPr lang="nl-NL" smtClean="0"/>
-              <a:t>38</a:t>
+              <a:t>37</a:t>
             </a:fld>
             <a:endParaRPr lang="nl-NL"/>
           </a:p>
@@ -15157,6 +14982,219 @@
 </p:sld>
 </file>
 
+<file path=ppt/slides/slide38.xml><?xml version="1.0" encoding="utf-8"?>
+<p:sld xmlns:a="http://schemas.openxmlformats.org/drawingml/2006/main" xmlns:r="http://schemas.openxmlformats.org/officeDocument/2006/relationships" xmlns:p="http://schemas.openxmlformats.org/presentationml/2006/main">
+  <p:cSld>
+    <p:spTree>
+      <p:nvGrpSpPr>
+        <p:cNvPr id="1" name=""/>
+        <p:cNvGrpSpPr/>
+        <p:nvPr/>
+      </p:nvGrpSpPr>
+      <p:grpSpPr>
+        <a:xfrm>
+          <a:off x="0" y="0"/>
+          <a:ext cx="0" cy="0"/>
+          <a:chOff x="0" y="0"/>
+          <a:chExt cx="0" cy="0"/>
+        </a:xfrm>
+      </p:grpSpPr>
+      <p:sp>
+        <p:nvSpPr>
+          <p:cNvPr id="2" name="Title 1">
+            <a:extLst>
+              <a:ext uri="{FF2B5EF4-FFF2-40B4-BE49-F238E27FC236}">
+                <a16:creationId xmlns:a16="http://schemas.microsoft.com/office/drawing/2014/main" id="{0FBBD13C-9B5E-4189-9E78-238477EC36AB}"/>
+              </a:ext>
+            </a:extLst>
+          </p:cNvPr>
+          <p:cNvSpPr>
+            <a:spLocks noGrp="1"/>
+          </p:cNvSpPr>
+          <p:nvPr>
+            <p:ph type="title"/>
+          </p:nvPr>
+        </p:nvSpPr>
+        <p:spPr/>
+        <p:txBody>
+          <a:bodyPr/>
+          <a:lstStyle/>
+          <a:p>
+            <a:r>
+              <a:rPr lang="en-GB" dirty="0"/>
+              <a:t>Aggregations(2)</a:t>
+            </a:r>
+            <a:endParaRPr lang="en-NL" dirty="0"/>
+          </a:p>
+        </p:txBody>
+      </p:sp>
+      <p:sp>
+        <p:nvSpPr>
+          <p:cNvPr id="3" name="Content Placeholder 2">
+            <a:extLst>
+              <a:ext uri="{FF2B5EF4-FFF2-40B4-BE49-F238E27FC236}">
+                <a16:creationId xmlns:a16="http://schemas.microsoft.com/office/drawing/2014/main" id="{E75347B0-CAEC-4097-9892-E6AB2B41EFBA}"/>
+              </a:ext>
+            </a:extLst>
+          </p:cNvPr>
+          <p:cNvSpPr>
+            <a:spLocks noGrp="1"/>
+          </p:cNvSpPr>
+          <p:nvPr>
+            <p:ph idx="1"/>
+          </p:nvPr>
+        </p:nvSpPr>
+        <p:spPr>
+          <a:xfrm>
+            <a:off x="720003" y="936000"/>
+            <a:ext cx="6246854" cy="3780000"/>
+          </a:xfrm>
+        </p:spPr>
+        <p:txBody>
+          <a:bodyPr/>
+          <a:lstStyle/>
+          <a:p>
+            <a:r>
+              <a:rPr lang="en-GB" dirty="0"/>
+              <a:t>Values used for aggregations can be extracted by setting a field key or by defining a script to generate the values</a:t>
+            </a:r>
+          </a:p>
+          <a:p>
+            <a:r>
+              <a:rPr lang="en-GB" dirty="0"/>
+              <a:t>Aggregations can be nested</a:t>
+            </a:r>
+          </a:p>
+          <a:p>
+            <a:endParaRPr lang="en-GB" dirty="0"/>
+          </a:p>
+          <a:p>
+            <a:r>
+              <a:rPr lang="en-GB" dirty="0"/>
+              <a:t>The results are shown below the query results</a:t>
+            </a:r>
+          </a:p>
+          <a:p>
+            <a:pPr lvl="1"/>
+            <a:r>
+              <a:rPr lang="en-GB" sz="1400" dirty="0"/>
+              <a:t>Set size to 0 to only get aggregation results</a:t>
+            </a:r>
+          </a:p>
+          <a:p>
+            <a:endParaRPr lang="en-GB" dirty="0"/>
+          </a:p>
+          <a:p>
+            <a:r>
+              <a:rPr lang="en-GB" dirty="0"/>
+              <a:t>Results are approximate for values above 2^53</a:t>
+            </a:r>
+          </a:p>
+          <a:p>
+            <a:endParaRPr lang="en-GB" dirty="0"/>
+          </a:p>
+          <a:p>
+            <a:endParaRPr lang="en-GB" dirty="0"/>
+          </a:p>
+          <a:p>
+            <a:endParaRPr lang="en-GB" dirty="0"/>
+          </a:p>
+          <a:p>
+            <a:endParaRPr lang="en-GB" dirty="0"/>
+          </a:p>
+          <a:p>
+            <a:endParaRPr lang="en-GB" dirty="0"/>
+          </a:p>
+          <a:p>
+            <a:endParaRPr lang="en-GB" dirty="0"/>
+          </a:p>
+          <a:p>
+            <a:r>
+              <a:rPr lang="nl-NL" sz="1100" dirty="0">
+                <a:hlinkClick r:id="rId2"/>
+              </a:rPr>
+              <a:t>https://www.elastic.co/guide/en/elasticsearch/reference/current/search-aggregations.html</a:t>
+            </a:r>
+            <a:endParaRPr lang="en-GB" sz="1100" dirty="0"/>
+          </a:p>
+          <a:p>
+            <a:endParaRPr lang="en-GB" dirty="0"/>
+          </a:p>
+          <a:p>
+            <a:endParaRPr lang="en-NL" dirty="0"/>
+          </a:p>
+        </p:txBody>
+      </p:sp>
+      <p:sp>
+        <p:nvSpPr>
+          <p:cNvPr id="4" name="Footer Placeholder 3">
+            <a:extLst>
+              <a:ext uri="{FF2B5EF4-FFF2-40B4-BE49-F238E27FC236}">
+                <a16:creationId xmlns:a16="http://schemas.microsoft.com/office/drawing/2014/main" id="{AD9E54D0-315F-488F-94D2-D6051BE52582}"/>
+              </a:ext>
+            </a:extLst>
+          </p:cNvPr>
+          <p:cNvSpPr>
+            <a:spLocks noGrp="1"/>
+          </p:cNvSpPr>
+          <p:nvPr>
+            <p:ph type="ftr" sz="quarter" idx="11"/>
+          </p:nvPr>
+        </p:nvSpPr>
+        <p:spPr/>
+        <p:txBody>
+          <a:bodyPr/>
+          <a:lstStyle/>
+          <a:p>
+            <a:r>
+              <a:rPr lang="nl-NL"/>
+              <a:t>elasticsearch</a:t>
+            </a:r>
+          </a:p>
+        </p:txBody>
+      </p:sp>
+      <p:sp>
+        <p:nvSpPr>
+          <p:cNvPr id="5" name="Slide Number Placeholder 4">
+            <a:extLst>
+              <a:ext uri="{FF2B5EF4-FFF2-40B4-BE49-F238E27FC236}">
+                <a16:creationId xmlns:a16="http://schemas.microsoft.com/office/drawing/2014/main" id="{44EC881E-E8A2-4D6D-8DC0-9AC56DCB7966}"/>
+              </a:ext>
+            </a:extLst>
+          </p:cNvPr>
+          <p:cNvSpPr>
+            <a:spLocks noGrp="1"/>
+          </p:cNvSpPr>
+          <p:nvPr>
+            <p:ph type="sldNum" sz="quarter" idx="12"/>
+          </p:nvPr>
+        </p:nvSpPr>
+        <p:spPr/>
+        <p:txBody>
+          <a:bodyPr/>
+          <a:lstStyle/>
+          <a:p>
+            <a:fld id="{14F1411D-0280-154F-AEAC-4C20B7AA46B2}" type="slidenum">
+              <a:rPr lang="nl-NL" smtClean="0"/>
+              <a:t>38</a:t>
+            </a:fld>
+            <a:endParaRPr lang="nl-NL"/>
+          </a:p>
+        </p:txBody>
+      </p:sp>
+    </p:spTree>
+    <p:extLst>
+      <p:ext uri="{BB962C8B-B14F-4D97-AF65-F5344CB8AC3E}">
+        <p14:creationId xmlns:p14="http://schemas.microsoft.com/office/powerpoint/2010/main" val="2742430367"/>
+      </p:ext>
+    </p:extLst>
+  </p:cSld>
+  <p:clrMapOvr>
+    <a:masterClrMapping/>
+  </p:clrMapOvr>
+</p:sld>
+</file>
+
 <file path=ppt/slides/slide39.xml><?xml version="1.0" encoding="utf-8"?>
 <p:sld xmlns:a="http://schemas.openxmlformats.org/drawingml/2006/main" xmlns:r="http://schemas.openxmlformats.org/officeDocument/2006/relationships" xmlns:p="http://schemas.openxmlformats.org/presentationml/2006/main">
   <p:cSld>
@@ -15179,631 +15217,6 @@
           <p:cNvPr id="2" name="Title 1">
             <a:extLst>
               <a:ext uri="{FF2B5EF4-FFF2-40B4-BE49-F238E27FC236}">
-                <a16:creationId xmlns:a16="http://schemas.microsoft.com/office/drawing/2014/main" id="{0FBBD13C-9B5E-4189-9E78-238477EC36AB}"/>
-              </a:ext>
-            </a:extLst>
-          </p:cNvPr>
-          <p:cNvSpPr>
-            <a:spLocks noGrp="1"/>
-          </p:cNvSpPr>
-          <p:nvPr>
-            <p:ph type="title"/>
-          </p:nvPr>
-        </p:nvSpPr>
-        <p:spPr/>
-        <p:txBody>
-          <a:bodyPr/>
-          <a:lstStyle/>
-          <a:p>
-            <a:r>
-              <a:rPr lang="en-GB" dirty="0"/>
-              <a:t>Aggregations(2)</a:t>
-            </a:r>
-            <a:endParaRPr lang="en-NL" dirty="0"/>
-          </a:p>
-        </p:txBody>
-      </p:sp>
-      <p:sp>
-        <p:nvSpPr>
-          <p:cNvPr id="3" name="Content Placeholder 2">
-            <a:extLst>
-              <a:ext uri="{FF2B5EF4-FFF2-40B4-BE49-F238E27FC236}">
-                <a16:creationId xmlns:a16="http://schemas.microsoft.com/office/drawing/2014/main" id="{E75347B0-CAEC-4097-9892-E6AB2B41EFBA}"/>
-              </a:ext>
-            </a:extLst>
-          </p:cNvPr>
-          <p:cNvSpPr>
-            <a:spLocks noGrp="1"/>
-          </p:cNvSpPr>
-          <p:nvPr>
-            <p:ph idx="1"/>
-          </p:nvPr>
-        </p:nvSpPr>
-        <p:spPr>
-          <a:xfrm>
-            <a:off x="720003" y="936000"/>
-            <a:ext cx="6246854" cy="3780000"/>
-          </a:xfrm>
-        </p:spPr>
-        <p:txBody>
-          <a:bodyPr/>
-          <a:lstStyle/>
-          <a:p>
-            <a:r>
-              <a:rPr lang="en-GB" dirty="0"/>
-              <a:t>Values used for aggregations can be extracted by setting a field key or by defining a script to generate the values</a:t>
-            </a:r>
-          </a:p>
-          <a:p>
-            <a:r>
-              <a:rPr lang="en-GB" dirty="0"/>
-              <a:t>Aggregations can be nested</a:t>
-            </a:r>
-          </a:p>
-          <a:p>
-            <a:endParaRPr lang="en-GB" dirty="0"/>
-          </a:p>
-          <a:p>
-            <a:r>
-              <a:rPr lang="en-GB" dirty="0"/>
-              <a:t>The results are shown below the query results</a:t>
-            </a:r>
-          </a:p>
-          <a:p>
-            <a:pPr lvl="1"/>
-            <a:r>
-              <a:rPr lang="en-GB" sz="1400" dirty="0"/>
-              <a:t>Set size to 0 to only get aggregation results</a:t>
-            </a:r>
-          </a:p>
-          <a:p>
-            <a:endParaRPr lang="en-GB" dirty="0"/>
-          </a:p>
-          <a:p>
-            <a:r>
-              <a:rPr lang="en-GB" dirty="0"/>
-              <a:t>Results are approximate for values above 2^53</a:t>
-            </a:r>
-          </a:p>
-          <a:p>
-            <a:endParaRPr lang="en-GB" dirty="0"/>
-          </a:p>
-          <a:p>
-            <a:endParaRPr lang="en-GB" dirty="0"/>
-          </a:p>
-          <a:p>
-            <a:endParaRPr lang="en-GB" dirty="0"/>
-          </a:p>
-          <a:p>
-            <a:endParaRPr lang="en-GB" dirty="0"/>
-          </a:p>
-          <a:p>
-            <a:endParaRPr lang="en-GB" dirty="0"/>
-          </a:p>
-          <a:p>
-            <a:endParaRPr lang="en-GB" dirty="0"/>
-          </a:p>
-          <a:p>
-            <a:r>
-              <a:rPr lang="nl-NL" sz="1100" dirty="0">
-                <a:hlinkClick r:id="rId2"/>
-              </a:rPr>
-              <a:t>https://www.elastic.co/guide/en/elasticsearch/reference/current/search-aggregations.html</a:t>
-            </a:r>
-            <a:endParaRPr lang="en-GB" sz="1100" dirty="0"/>
-          </a:p>
-          <a:p>
-            <a:endParaRPr lang="en-GB" dirty="0"/>
-          </a:p>
-          <a:p>
-            <a:endParaRPr lang="en-NL" dirty="0"/>
-          </a:p>
-        </p:txBody>
-      </p:sp>
-      <p:sp>
-        <p:nvSpPr>
-          <p:cNvPr id="4" name="Footer Placeholder 3">
-            <a:extLst>
-              <a:ext uri="{FF2B5EF4-FFF2-40B4-BE49-F238E27FC236}">
-                <a16:creationId xmlns:a16="http://schemas.microsoft.com/office/drawing/2014/main" id="{AD9E54D0-315F-488F-94D2-D6051BE52582}"/>
-              </a:ext>
-            </a:extLst>
-          </p:cNvPr>
-          <p:cNvSpPr>
-            <a:spLocks noGrp="1"/>
-          </p:cNvSpPr>
-          <p:nvPr>
-            <p:ph type="ftr" sz="quarter" idx="11"/>
-          </p:nvPr>
-        </p:nvSpPr>
-        <p:spPr/>
-        <p:txBody>
-          <a:bodyPr/>
-          <a:lstStyle/>
-          <a:p>
-            <a:r>
-              <a:rPr lang="nl-NL"/>
-              <a:t>elasticsearch</a:t>
-            </a:r>
-          </a:p>
-        </p:txBody>
-      </p:sp>
-      <p:sp>
-        <p:nvSpPr>
-          <p:cNvPr id="5" name="Slide Number Placeholder 4">
-            <a:extLst>
-              <a:ext uri="{FF2B5EF4-FFF2-40B4-BE49-F238E27FC236}">
-                <a16:creationId xmlns:a16="http://schemas.microsoft.com/office/drawing/2014/main" id="{44EC881E-E8A2-4D6D-8DC0-9AC56DCB7966}"/>
-              </a:ext>
-            </a:extLst>
-          </p:cNvPr>
-          <p:cNvSpPr>
-            <a:spLocks noGrp="1"/>
-          </p:cNvSpPr>
-          <p:nvPr>
-            <p:ph type="sldNum" sz="quarter" idx="12"/>
-          </p:nvPr>
-        </p:nvSpPr>
-        <p:spPr/>
-        <p:txBody>
-          <a:bodyPr/>
-          <a:lstStyle/>
-          <a:p>
-            <a:fld id="{14F1411D-0280-154F-AEAC-4C20B7AA46B2}" type="slidenum">
-              <a:rPr lang="nl-NL" smtClean="0"/>
-              <a:t>39</a:t>
-            </a:fld>
-            <a:endParaRPr lang="nl-NL"/>
-          </a:p>
-        </p:txBody>
-      </p:sp>
-    </p:spTree>
-    <p:extLst>
-      <p:ext uri="{BB962C8B-B14F-4D97-AF65-F5344CB8AC3E}">
-        <p14:creationId xmlns:p14="http://schemas.microsoft.com/office/powerpoint/2010/main" val="2742430367"/>
-      </p:ext>
-    </p:extLst>
-  </p:cSld>
-  <p:clrMapOvr>
-    <a:masterClrMapping/>
-  </p:clrMapOvr>
-</p:sld>
-</file>
-
-<file path=ppt/slides/slide4.xml><?xml version="1.0" encoding="utf-8"?>
-<p:sld xmlns:a="http://schemas.openxmlformats.org/drawingml/2006/main" xmlns:r="http://schemas.openxmlformats.org/officeDocument/2006/relationships" xmlns:p="http://schemas.openxmlformats.org/presentationml/2006/main">
-  <p:cSld>
-    <p:spTree>
-      <p:nvGrpSpPr>
-        <p:cNvPr id="1" name=""/>
-        <p:cNvGrpSpPr/>
-        <p:nvPr/>
-      </p:nvGrpSpPr>
-      <p:grpSpPr>
-        <a:xfrm>
-          <a:off x="0" y="0"/>
-          <a:ext cx="0" cy="0"/>
-          <a:chOff x="0" y="0"/>
-          <a:chExt cx="0" cy="0"/>
-        </a:xfrm>
-      </p:grpSpPr>
-      <p:sp>
-        <p:nvSpPr>
-          <p:cNvPr id="4" name="Footer Placeholder 3">
-            <a:extLst>
-              <a:ext uri="{FF2B5EF4-FFF2-40B4-BE49-F238E27FC236}">
-                <a16:creationId xmlns:a16="http://schemas.microsoft.com/office/drawing/2014/main" id="{6F58536D-8C0A-49D6-A955-755810636955}"/>
-              </a:ext>
-            </a:extLst>
-          </p:cNvPr>
-          <p:cNvSpPr>
-            <a:spLocks noGrp="1"/>
-          </p:cNvSpPr>
-          <p:nvPr>
-            <p:ph type="ftr" sz="quarter" idx="11"/>
-          </p:nvPr>
-        </p:nvSpPr>
-        <p:spPr>
-          <a:xfrm>
-            <a:off x="4968000" y="5004000"/>
-            <a:ext cx="3240000" cy="108000"/>
-          </a:xfrm>
-        </p:spPr>
-        <p:txBody>
-          <a:bodyPr anchor="t">
-            <a:normAutofit/>
-          </a:bodyPr>
-          <a:lstStyle/>
-          <a:p>
-            <a:pPr>
-              <a:spcAft>
-                <a:spcPts val="600"/>
-              </a:spcAft>
-            </a:pPr>
-            <a:r>
-              <a:rPr lang="nl-NL"/>
-              <a:t>elasticsearch</a:t>
-            </a:r>
-          </a:p>
-        </p:txBody>
-      </p:sp>
-      <p:sp>
-        <p:nvSpPr>
-          <p:cNvPr id="5" name="Slide Number Placeholder 4">
-            <a:extLst>
-              <a:ext uri="{FF2B5EF4-FFF2-40B4-BE49-F238E27FC236}">
-                <a16:creationId xmlns:a16="http://schemas.microsoft.com/office/drawing/2014/main" id="{E8C2995E-923F-4DB6-9ABB-F11BCF2949B1}"/>
-              </a:ext>
-            </a:extLst>
-          </p:cNvPr>
-          <p:cNvSpPr>
-            <a:spLocks noGrp="1"/>
-          </p:cNvSpPr>
-          <p:nvPr>
-            <p:ph type="sldNum" sz="quarter" idx="12"/>
-          </p:nvPr>
-        </p:nvSpPr>
-        <p:spPr>
-          <a:xfrm>
-            <a:off x="8280000" y="5004000"/>
-            <a:ext cx="144000" cy="108000"/>
-          </a:xfrm>
-        </p:spPr>
-        <p:txBody>
-          <a:bodyPr anchor="t">
-            <a:normAutofit/>
-          </a:bodyPr>
-          <a:lstStyle/>
-          <a:p>
-            <a:pPr>
-              <a:spcAft>
-                <a:spcPts val="600"/>
-              </a:spcAft>
-            </a:pPr>
-            <a:fld id="{14F1411D-0280-154F-AEAC-4C20B7AA46B2}" type="slidenum">
-              <a:rPr lang="nl-NL" smtClean="0"/>
-              <a:pPr>
-                <a:spcAft>
-                  <a:spcPts val="600"/>
-                </a:spcAft>
-              </a:pPr>
-              <a:t>4</a:t>
-            </a:fld>
-            <a:endParaRPr lang="nl-NL"/>
-          </a:p>
-        </p:txBody>
-      </p:sp>
-      <p:sp>
-        <p:nvSpPr>
-          <p:cNvPr id="2" name="Title 1">
-            <a:extLst>
-              <a:ext uri="{FF2B5EF4-FFF2-40B4-BE49-F238E27FC236}">
-                <a16:creationId xmlns:a16="http://schemas.microsoft.com/office/drawing/2014/main" id="{4BD4825D-FA67-4C25-82CD-0C507000932B}"/>
-              </a:ext>
-            </a:extLst>
-          </p:cNvPr>
-          <p:cNvSpPr>
-            <a:spLocks noGrp="1"/>
-          </p:cNvSpPr>
-          <p:nvPr>
-            <p:ph type="title"/>
-          </p:nvPr>
-        </p:nvSpPr>
-        <p:spPr>
-          <a:xfrm>
-            <a:off x="719999" y="288000"/>
-            <a:ext cx="6624000" cy="504000"/>
-          </a:xfrm>
-        </p:spPr>
-        <p:txBody>
-          <a:bodyPr anchor="ctr">
-            <a:normAutofit/>
-          </a:bodyPr>
-          <a:lstStyle/>
-          <a:p>
-            <a:r>
-              <a:rPr lang="en-GB" dirty="0"/>
-              <a:t>Advantages and disadvantages</a:t>
-            </a:r>
-            <a:endParaRPr lang="en-NL" dirty="0"/>
-          </a:p>
-        </p:txBody>
-      </p:sp>
-      <p:sp>
-        <p:nvSpPr>
-          <p:cNvPr id="3" name="Content Placeholder 2">
-            <a:extLst>
-              <a:ext uri="{FF2B5EF4-FFF2-40B4-BE49-F238E27FC236}">
-                <a16:creationId xmlns:a16="http://schemas.microsoft.com/office/drawing/2014/main" id="{797DA23D-AC0E-4F5C-AD50-F75A088F9E04}"/>
-              </a:ext>
-            </a:extLst>
-          </p:cNvPr>
-          <p:cNvSpPr>
-            <a:spLocks noGrp="1"/>
-          </p:cNvSpPr>
-          <p:nvPr>
-            <p:ph idx="1"/>
-          </p:nvPr>
-        </p:nvSpPr>
-        <p:spPr>
-          <a:xfrm>
-            <a:off x="720003" y="1224000"/>
-            <a:ext cx="3744993" cy="3491999"/>
-          </a:xfrm>
-        </p:spPr>
-        <p:txBody>
-          <a:bodyPr anchor="t">
-            <a:normAutofit/>
-          </a:bodyPr>
-          <a:lstStyle/>
-          <a:p>
-            <a:pPr>
-              <a:spcAft>
-                <a:spcPts val="600"/>
-              </a:spcAft>
-            </a:pPr>
-            <a:r>
-              <a:rPr lang="en-GB" dirty="0"/>
-              <a:t>Fast searching of big data sets</a:t>
-            </a:r>
-          </a:p>
-          <a:p>
-            <a:pPr>
-              <a:spcAft>
-                <a:spcPts val="600"/>
-              </a:spcAft>
-            </a:pPr>
-            <a:r>
-              <a:rPr lang="en-GB" dirty="0"/>
-              <a:t>Full-text search</a:t>
-            </a:r>
-          </a:p>
-          <a:p>
-            <a:pPr>
-              <a:spcAft>
-                <a:spcPts val="600"/>
-              </a:spcAft>
-            </a:pPr>
-            <a:r>
-              <a:rPr lang="en-GB" dirty="0"/>
-              <a:t>Fuzzy searching</a:t>
-            </a:r>
-          </a:p>
-          <a:p>
-            <a:pPr>
-              <a:spcAft>
-                <a:spcPts val="600"/>
-              </a:spcAft>
-            </a:pPr>
-            <a:r>
-              <a:rPr lang="en-GB" dirty="0"/>
-              <a:t>Aggregations of data</a:t>
-            </a:r>
-          </a:p>
-          <a:p>
-            <a:pPr>
-              <a:spcAft>
-                <a:spcPts val="600"/>
-              </a:spcAft>
-            </a:pPr>
-            <a:r>
-              <a:rPr lang="en-GB" dirty="0"/>
-              <a:t>Easy to index</a:t>
-            </a:r>
-          </a:p>
-          <a:p>
-            <a:pPr>
-              <a:spcAft>
-                <a:spcPts val="600"/>
-              </a:spcAft>
-            </a:pPr>
-            <a:r>
-              <a:rPr lang="en-GB" dirty="0"/>
-              <a:t>Easily scalable</a:t>
-            </a:r>
-          </a:p>
-          <a:p>
-            <a:pPr>
-              <a:spcAft>
-                <a:spcPts val="600"/>
-              </a:spcAft>
-            </a:pPr>
-            <a:endParaRPr lang="en-GB" dirty="0"/>
-          </a:p>
-          <a:p>
-            <a:pPr lvl="1">
-              <a:spcAft>
-                <a:spcPts val="600"/>
-              </a:spcAft>
-            </a:pPr>
-            <a:endParaRPr lang="en-GB" dirty="0"/>
-          </a:p>
-          <a:p>
-            <a:pPr lvl="1">
-              <a:spcAft>
-                <a:spcPts val="600"/>
-              </a:spcAft>
-            </a:pPr>
-            <a:endParaRPr lang="en-GB" dirty="0"/>
-          </a:p>
-          <a:p>
-            <a:pPr lvl="1">
-              <a:spcAft>
-                <a:spcPts val="600"/>
-              </a:spcAft>
-            </a:pPr>
-            <a:endParaRPr lang="en-GB" dirty="0"/>
-          </a:p>
-          <a:p>
-            <a:pPr>
-              <a:spcAft>
-                <a:spcPts val="600"/>
-              </a:spcAft>
-            </a:pPr>
-            <a:endParaRPr lang="en-NL" dirty="0"/>
-          </a:p>
-        </p:txBody>
-      </p:sp>
-      <p:sp>
-        <p:nvSpPr>
-          <p:cNvPr id="10" name="Text Placeholder 5">
-            <a:extLst>
-              <a:ext uri="{FF2B5EF4-FFF2-40B4-BE49-F238E27FC236}">
-                <a16:creationId xmlns:a16="http://schemas.microsoft.com/office/drawing/2014/main" id="{C941C9D8-1DC1-464B-AAF3-DC82E2B25AD5}"/>
-              </a:ext>
-            </a:extLst>
-          </p:cNvPr>
-          <p:cNvSpPr>
-            <a:spLocks noGrp="1"/>
-          </p:cNvSpPr>
-          <p:nvPr>
-            <p:ph type="body" idx="13"/>
-          </p:nvPr>
-        </p:nvSpPr>
-        <p:spPr>
-          <a:xfrm>
-            <a:off x="719998" y="936000"/>
-            <a:ext cx="3744995" cy="288000"/>
-          </a:xfrm>
-        </p:spPr>
-        <p:txBody>
-          <a:bodyPr/>
-          <a:lstStyle/>
-          <a:p>
-            <a:r>
-              <a:rPr lang="en-GB" dirty="0"/>
-              <a:t>Advantages</a:t>
-            </a:r>
-            <a:endParaRPr lang="en-US" dirty="0"/>
-          </a:p>
-        </p:txBody>
-      </p:sp>
-      <p:sp>
-        <p:nvSpPr>
-          <p:cNvPr id="12" name="Content Placeholder 6">
-            <a:extLst>
-              <a:ext uri="{FF2B5EF4-FFF2-40B4-BE49-F238E27FC236}">
-                <a16:creationId xmlns:a16="http://schemas.microsoft.com/office/drawing/2014/main" id="{9A0E28AF-E1E4-4D60-89A3-4EC60970E223}"/>
-              </a:ext>
-            </a:extLst>
-          </p:cNvPr>
-          <p:cNvSpPr>
-            <a:spLocks noGrp="1"/>
-          </p:cNvSpPr>
-          <p:nvPr>
-            <p:ph idx="14"/>
-          </p:nvPr>
-        </p:nvSpPr>
-        <p:spPr>
-          <a:xfrm>
-            <a:off x="4679007" y="1224000"/>
-            <a:ext cx="3744993" cy="3491999"/>
-          </a:xfrm>
-        </p:spPr>
-        <p:txBody>
-          <a:bodyPr/>
-          <a:lstStyle/>
-          <a:p>
-            <a:r>
-              <a:rPr lang="en-US" dirty="0"/>
-              <a:t>Relatively slow at adding new data</a:t>
-            </a:r>
-          </a:p>
-          <a:p>
-            <a:r>
-              <a:rPr lang="en-US" dirty="0"/>
-              <a:t>No “blocking” of transactions</a:t>
-            </a:r>
-          </a:p>
-          <a:p>
-            <a:r>
-              <a:rPr lang="en-US" dirty="0"/>
-              <a:t>No feature for authorization or authentication</a:t>
-            </a:r>
-          </a:p>
-          <a:p>
-            <a:r>
-              <a:rPr lang="en-US" dirty="0"/>
-              <a:t>Cluster can become irrecoverable after hardware failure or power outage resulting in data loss -&gt; use other database as primary</a:t>
-            </a:r>
-          </a:p>
-          <a:p>
-            <a:r>
-              <a:rPr lang="en-US" dirty="0"/>
-              <a:t>“Complex” query mechanism</a:t>
-            </a:r>
-          </a:p>
-        </p:txBody>
-      </p:sp>
-      <p:sp>
-        <p:nvSpPr>
-          <p:cNvPr id="14" name="Text Placeholder 7">
-            <a:extLst>
-              <a:ext uri="{FF2B5EF4-FFF2-40B4-BE49-F238E27FC236}">
-                <a16:creationId xmlns:a16="http://schemas.microsoft.com/office/drawing/2014/main" id="{05B8CDAC-55A7-424C-BA47-2F6F425C2922}"/>
-              </a:ext>
-            </a:extLst>
-          </p:cNvPr>
-          <p:cNvSpPr>
-            <a:spLocks noGrp="1"/>
-          </p:cNvSpPr>
-          <p:nvPr>
-            <p:ph type="body" idx="15"/>
-          </p:nvPr>
-        </p:nvSpPr>
-        <p:spPr>
-          <a:xfrm>
-            <a:off x="4679004" y="936000"/>
-            <a:ext cx="3744995" cy="288000"/>
-          </a:xfrm>
-        </p:spPr>
-        <p:txBody>
-          <a:bodyPr/>
-          <a:lstStyle/>
-          <a:p>
-            <a:r>
-              <a:rPr lang="en-GB" dirty="0"/>
-              <a:t>Disadvantages</a:t>
-            </a:r>
-            <a:endParaRPr lang="en-US" dirty="0"/>
-          </a:p>
-        </p:txBody>
-      </p:sp>
-    </p:spTree>
-    <p:extLst>
-      <p:ext uri="{BB962C8B-B14F-4D97-AF65-F5344CB8AC3E}">
-        <p14:creationId xmlns:p14="http://schemas.microsoft.com/office/powerpoint/2010/main" val="1189262961"/>
-      </p:ext>
-    </p:extLst>
-  </p:cSld>
-  <p:clrMapOvr>
-    <a:masterClrMapping/>
-  </p:clrMapOvr>
-</p:sld>
-</file>
-
-<file path=ppt/slides/slide40.xml><?xml version="1.0" encoding="utf-8"?>
-<p:sld xmlns:a="http://schemas.openxmlformats.org/drawingml/2006/main" xmlns:r="http://schemas.openxmlformats.org/officeDocument/2006/relationships" xmlns:p="http://schemas.openxmlformats.org/presentationml/2006/main">
-  <p:cSld>
-    <p:spTree>
-      <p:nvGrpSpPr>
-        <p:cNvPr id="1" name=""/>
-        <p:cNvGrpSpPr/>
-        <p:nvPr/>
-      </p:nvGrpSpPr>
-      <p:grpSpPr>
-        <a:xfrm>
-          <a:off x="0" y="0"/>
-          <a:ext cx="0" cy="0"/>
-          <a:chOff x="0" y="0"/>
-          <a:chExt cx="0" cy="0"/>
-        </a:xfrm>
-      </p:grpSpPr>
-      <p:sp>
-        <p:nvSpPr>
-          <p:cNvPr id="2" name="Title 1">
-            <a:extLst>
-              <a:ext uri="{FF2B5EF4-FFF2-40B4-BE49-F238E27FC236}">
                 <a16:creationId xmlns:a16="http://schemas.microsoft.com/office/drawing/2014/main" id="{3DE75532-20F6-410C-B18D-9F4325408632}"/>
               </a:ext>
             </a:extLst>
@@ -15965,7 +15378,7 @@
           <a:p>
             <a:fld id="{14F1411D-0280-154F-AEAC-4C20B7AA46B2}" type="slidenum">
               <a:rPr lang="nl-NL" smtClean="0"/>
-              <a:t>40</a:t>
+              <a:t>39</a:t>
             </a:fld>
             <a:endParaRPr lang="nl-NL"/>
           </a:p>
@@ -16042,7 +15455,7 @@
 </p:sld>
 </file>
 
-<file path=ppt/slides/slide41.xml><?xml version="1.0" encoding="utf-8"?>
+<file path=ppt/slides/slide4.xml><?xml version="1.0" encoding="utf-8"?>
 <p:sld xmlns:a="http://schemas.openxmlformats.org/drawingml/2006/main" xmlns:r="http://schemas.openxmlformats.org/officeDocument/2006/relationships" xmlns:p="http://schemas.openxmlformats.org/presentationml/2006/main">
   <p:cSld>
     <p:spTree>
@@ -16061,6 +15474,418 @@
       </p:grpSpPr>
       <p:sp>
         <p:nvSpPr>
+          <p:cNvPr id="4" name="Footer Placeholder 3">
+            <a:extLst>
+              <a:ext uri="{FF2B5EF4-FFF2-40B4-BE49-F238E27FC236}">
+                <a16:creationId xmlns:a16="http://schemas.microsoft.com/office/drawing/2014/main" id="{6F58536D-8C0A-49D6-A955-755810636955}"/>
+              </a:ext>
+            </a:extLst>
+          </p:cNvPr>
+          <p:cNvSpPr>
+            <a:spLocks noGrp="1"/>
+          </p:cNvSpPr>
+          <p:nvPr>
+            <p:ph type="ftr" sz="quarter" idx="11"/>
+          </p:nvPr>
+        </p:nvSpPr>
+        <p:spPr>
+          <a:xfrm>
+            <a:off x="4968000" y="5004000"/>
+            <a:ext cx="3240000" cy="108000"/>
+          </a:xfrm>
+        </p:spPr>
+        <p:txBody>
+          <a:bodyPr anchor="t">
+            <a:normAutofit/>
+          </a:bodyPr>
+          <a:lstStyle/>
+          <a:p>
+            <a:pPr>
+              <a:spcAft>
+                <a:spcPts val="600"/>
+              </a:spcAft>
+            </a:pPr>
+            <a:r>
+              <a:rPr lang="nl-NL"/>
+              <a:t>elasticsearch</a:t>
+            </a:r>
+          </a:p>
+        </p:txBody>
+      </p:sp>
+      <p:sp>
+        <p:nvSpPr>
+          <p:cNvPr id="5" name="Slide Number Placeholder 4">
+            <a:extLst>
+              <a:ext uri="{FF2B5EF4-FFF2-40B4-BE49-F238E27FC236}">
+                <a16:creationId xmlns:a16="http://schemas.microsoft.com/office/drawing/2014/main" id="{E8C2995E-923F-4DB6-9ABB-F11BCF2949B1}"/>
+              </a:ext>
+            </a:extLst>
+          </p:cNvPr>
+          <p:cNvSpPr>
+            <a:spLocks noGrp="1"/>
+          </p:cNvSpPr>
+          <p:nvPr>
+            <p:ph type="sldNum" sz="quarter" idx="12"/>
+          </p:nvPr>
+        </p:nvSpPr>
+        <p:spPr>
+          <a:xfrm>
+            <a:off x="8280000" y="5004000"/>
+            <a:ext cx="144000" cy="108000"/>
+          </a:xfrm>
+        </p:spPr>
+        <p:txBody>
+          <a:bodyPr anchor="t">
+            <a:normAutofit/>
+          </a:bodyPr>
+          <a:lstStyle/>
+          <a:p>
+            <a:pPr>
+              <a:spcAft>
+                <a:spcPts val="600"/>
+              </a:spcAft>
+            </a:pPr>
+            <a:fld id="{14F1411D-0280-154F-AEAC-4C20B7AA46B2}" type="slidenum">
+              <a:rPr lang="nl-NL" smtClean="0"/>
+              <a:pPr>
+                <a:spcAft>
+                  <a:spcPts val="600"/>
+                </a:spcAft>
+              </a:pPr>
+              <a:t>4</a:t>
+            </a:fld>
+            <a:endParaRPr lang="nl-NL"/>
+          </a:p>
+        </p:txBody>
+      </p:sp>
+      <p:sp>
+        <p:nvSpPr>
+          <p:cNvPr id="2" name="Title 1">
+            <a:extLst>
+              <a:ext uri="{FF2B5EF4-FFF2-40B4-BE49-F238E27FC236}">
+                <a16:creationId xmlns:a16="http://schemas.microsoft.com/office/drawing/2014/main" id="{4BD4825D-FA67-4C25-82CD-0C507000932B}"/>
+              </a:ext>
+            </a:extLst>
+          </p:cNvPr>
+          <p:cNvSpPr>
+            <a:spLocks noGrp="1"/>
+          </p:cNvSpPr>
+          <p:nvPr>
+            <p:ph type="title"/>
+          </p:nvPr>
+        </p:nvSpPr>
+        <p:spPr>
+          <a:xfrm>
+            <a:off x="719999" y="288000"/>
+            <a:ext cx="6624000" cy="504000"/>
+          </a:xfrm>
+        </p:spPr>
+        <p:txBody>
+          <a:bodyPr anchor="ctr">
+            <a:normAutofit/>
+          </a:bodyPr>
+          <a:lstStyle/>
+          <a:p>
+            <a:r>
+              <a:rPr lang="en-GB" dirty="0"/>
+              <a:t>Advantages and disadvantages</a:t>
+            </a:r>
+            <a:endParaRPr lang="en-NL" dirty="0"/>
+          </a:p>
+        </p:txBody>
+      </p:sp>
+      <p:sp>
+        <p:nvSpPr>
+          <p:cNvPr id="3" name="Content Placeholder 2">
+            <a:extLst>
+              <a:ext uri="{FF2B5EF4-FFF2-40B4-BE49-F238E27FC236}">
+                <a16:creationId xmlns:a16="http://schemas.microsoft.com/office/drawing/2014/main" id="{797DA23D-AC0E-4F5C-AD50-F75A088F9E04}"/>
+              </a:ext>
+            </a:extLst>
+          </p:cNvPr>
+          <p:cNvSpPr>
+            <a:spLocks noGrp="1"/>
+          </p:cNvSpPr>
+          <p:nvPr>
+            <p:ph idx="1"/>
+          </p:nvPr>
+        </p:nvSpPr>
+        <p:spPr>
+          <a:xfrm>
+            <a:off x="720003" y="1224000"/>
+            <a:ext cx="3744993" cy="3491999"/>
+          </a:xfrm>
+        </p:spPr>
+        <p:txBody>
+          <a:bodyPr anchor="t">
+            <a:normAutofit/>
+          </a:bodyPr>
+          <a:lstStyle/>
+          <a:p>
+            <a:pPr>
+              <a:spcAft>
+                <a:spcPts val="600"/>
+              </a:spcAft>
+            </a:pPr>
+            <a:r>
+              <a:rPr lang="en-GB" dirty="0"/>
+              <a:t>Fast searching of big data sets</a:t>
+            </a:r>
+          </a:p>
+          <a:p>
+            <a:pPr>
+              <a:spcAft>
+                <a:spcPts val="600"/>
+              </a:spcAft>
+            </a:pPr>
+            <a:r>
+              <a:rPr lang="en-GB" dirty="0"/>
+              <a:t>Full-text search</a:t>
+            </a:r>
+          </a:p>
+          <a:p>
+            <a:pPr>
+              <a:spcAft>
+                <a:spcPts val="600"/>
+              </a:spcAft>
+            </a:pPr>
+            <a:r>
+              <a:rPr lang="en-GB" dirty="0"/>
+              <a:t>Fuzzy searching</a:t>
+            </a:r>
+          </a:p>
+          <a:p>
+            <a:pPr>
+              <a:spcAft>
+                <a:spcPts val="600"/>
+              </a:spcAft>
+            </a:pPr>
+            <a:r>
+              <a:rPr lang="en-GB" dirty="0"/>
+              <a:t>Aggregations of data</a:t>
+            </a:r>
+          </a:p>
+          <a:p>
+            <a:pPr>
+              <a:spcAft>
+                <a:spcPts val="600"/>
+              </a:spcAft>
+            </a:pPr>
+            <a:r>
+              <a:rPr lang="en-GB" dirty="0"/>
+              <a:t>Easy to index</a:t>
+            </a:r>
+          </a:p>
+          <a:p>
+            <a:pPr>
+              <a:spcAft>
+                <a:spcPts val="600"/>
+              </a:spcAft>
+            </a:pPr>
+            <a:r>
+              <a:rPr lang="en-GB" dirty="0"/>
+              <a:t>Easily scalable</a:t>
+            </a:r>
+          </a:p>
+          <a:p>
+            <a:pPr>
+              <a:spcAft>
+                <a:spcPts val="600"/>
+              </a:spcAft>
+            </a:pPr>
+            <a:endParaRPr lang="en-GB" dirty="0"/>
+          </a:p>
+          <a:p>
+            <a:pPr lvl="1">
+              <a:spcAft>
+                <a:spcPts val="600"/>
+              </a:spcAft>
+            </a:pPr>
+            <a:endParaRPr lang="en-GB" dirty="0"/>
+          </a:p>
+          <a:p>
+            <a:pPr lvl="1">
+              <a:spcAft>
+                <a:spcPts val="600"/>
+              </a:spcAft>
+            </a:pPr>
+            <a:endParaRPr lang="en-GB" dirty="0"/>
+          </a:p>
+          <a:p>
+            <a:pPr lvl="1">
+              <a:spcAft>
+                <a:spcPts val="600"/>
+              </a:spcAft>
+            </a:pPr>
+            <a:endParaRPr lang="en-GB" dirty="0"/>
+          </a:p>
+          <a:p>
+            <a:pPr>
+              <a:spcAft>
+                <a:spcPts val="600"/>
+              </a:spcAft>
+            </a:pPr>
+            <a:endParaRPr lang="en-NL" dirty="0"/>
+          </a:p>
+        </p:txBody>
+      </p:sp>
+      <p:sp>
+        <p:nvSpPr>
+          <p:cNvPr id="10" name="Text Placeholder 5">
+            <a:extLst>
+              <a:ext uri="{FF2B5EF4-FFF2-40B4-BE49-F238E27FC236}">
+                <a16:creationId xmlns:a16="http://schemas.microsoft.com/office/drawing/2014/main" id="{C941C9D8-1DC1-464B-AAF3-DC82E2B25AD5}"/>
+              </a:ext>
+            </a:extLst>
+          </p:cNvPr>
+          <p:cNvSpPr>
+            <a:spLocks noGrp="1"/>
+          </p:cNvSpPr>
+          <p:nvPr>
+            <p:ph type="body" idx="13"/>
+          </p:nvPr>
+        </p:nvSpPr>
+        <p:spPr>
+          <a:xfrm>
+            <a:off x="719998" y="936000"/>
+            <a:ext cx="3744995" cy="288000"/>
+          </a:xfrm>
+        </p:spPr>
+        <p:txBody>
+          <a:bodyPr/>
+          <a:lstStyle/>
+          <a:p>
+            <a:r>
+              <a:rPr lang="en-GB" dirty="0"/>
+              <a:t>Advantages</a:t>
+            </a:r>
+            <a:endParaRPr lang="en-US" dirty="0"/>
+          </a:p>
+        </p:txBody>
+      </p:sp>
+      <p:sp>
+        <p:nvSpPr>
+          <p:cNvPr id="12" name="Content Placeholder 6">
+            <a:extLst>
+              <a:ext uri="{FF2B5EF4-FFF2-40B4-BE49-F238E27FC236}">
+                <a16:creationId xmlns:a16="http://schemas.microsoft.com/office/drawing/2014/main" id="{9A0E28AF-E1E4-4D60-89A3-4EC60970E223}"/>
+              </a:ext>
+            </a:extLst>
+          </p:cNvPr>
+          <p:cNvSpPr>
+            <a:spLocks noGrp="1"/>
+          </p:cNvSpPr>
+          <p:nvPr>
+            <p:ph idx="14"/>
+          </p:nvPr>
+        </p:nvSpPr>
+        <p:spPr>
+          <a:xfrm>
+            <a:off x="4679007" y="1224000"/>
+            <a:ext cx="3744993" cy="3491999"/>
+          </a:xfrm>
+        </p:spPr>
+        <p:txBody>
+          <a:bodyPr/>
+          <a:lstStyle/>
+          <a:p>
+            <a:r>
+              <a:rPr lang="en-US" dirty="0"/>
+              <a:t>Relatively slow at adding new data</a:t>
+            </a:r>
+          </a:p>
+          <a:p>
+            <a:r>
+              <a:rPr lang="en-US" dirty="0"/>
+              <a:t>No “blocking” of transactions</a:t>
+            </a:r>
+          </a:p>
+          <a:p>
+            <a:r>
+              <a:rPr lang="en-US" dirty="0"/>
+              <a:t>No feature for authorization or authentication</a:t>
+            </a:r>
+          </a:p>
+          <a:p>
+            <a:r>
+              <a:rPr lang="en-US" dirty="0"/>
+              <a:t>Cluster can become irrecoverable after hardware failure or power outage resulting in data loss -&gt; use other database as primary</a:t>
+            </a:r>
+          </a:p>
+          <a:p>
+            <a:r>
+              <a:rPr lang="en-US" dirty="0"/>
+              <a:t>“Complex” query mechanism</a:t>
+            </a:r>
+          </a:p>
+        </p:txBody>
+      </p:sp>
+      <p:sp>
+        <p:nvSpPr>
+          <p:cNvPr id="14" name="Text Placeholder 7">
+            <a:extLst>
+              <a:ext uri="{FF2B5EF4-FFF2-40B4-BE49-F238E27FC236}">
+                <a16:creationId xmlns:a16="http://schemas.microsoft.com/office/drawing/2014/main" id="{05B8CDAC-55A7-424C-BA47-2F6F425C2922}"/>
+              </a:ext>
+            </a:extLst>
+          </p:cNvPr>
+          <p:cNvSpPr>
+            <a:spLocks noGrp="1"/>
+          </p:cNvSpPr>
+          <p:nvPr>
+            <p:ph type="body" idx="15"/>
+          </p:nvPr>
+        </p:nvSpPr>
+        <p:spPr>
+          <a:xfrm>
+            <a:off x="4679004" y="936000"/>
+            <a:ext cx="3744995" cy="288000"/>
+          </a:xfrm>
+        </p:spPr>
+        <p:txBody>
+          <a:bodyPr/>
+          <a:lstStyle/>
+          <a:p>
+            <a:r>
+              <a:rPr lang="en-GB" dirty="0"/>
+              <a:t>Disadvantages</a:t>
+            </a:r>
+            <a:endParaRPr lang="en-US" dirty="0"/>
+          </a:p>
+        </p:txBody>
+      </p:sp>
+    </p:spTree>
+    <p:extLst>
+      <p:ext uri="{BB962C8B-B14F-4D97-AF65-F5344CB8AC3E}">
+        <p14:creationId xmlns:p14="http://schemas.microsoft.com/office/powerpoint/2010/main" val="1189262961"/>
+      </p:ext>
+    </p:extLst>
+  </p:cSld>
+  <p:clrMapOvr>
+    <a:masterClrMapping/>
+  </p:clrMapOvr>
+</p:sld>
+</file>
+
+<file path=ppt/slides/slide40.xml><?xml version="1.0" encoding="utf-8"?>
+<p:sld xmlns:a="http://schemas.openxmlformats.org/drawingml/2006/main" xmlns:r="http://schemas.openxmlformats.org/officeDocument/2006/relationships" xmlns:p="http://schemas.openxmlformats.org/presentationml/2006/main">
+  <p:cSld>
+    <p:spTree>
+      <p:nvGrpSpPr>
+        <p:cNvPr id="1" name=""/>
+        <p:cNvGrpSpPr/>
+        <p:nvPr/>
+      </p:nvGrpSpPr>
+      <p:grpSpPr>
+        <a:xfrm>
+          <a:off x="0" y="0"/>
+          <a:ext cx="0" cy="0"/>
+          <a:chOff x="0" y="0"/>
+          <a:chExt cx="0" cy="0"/>
+        </a:xfrm>
+      </p:grpSpPr>
+      <p:sp>
+        <p:nvSpPr>
           <p:cNvPr id="2" name="Title 1">
             <a:extLst>
               <a:ext uri="{FF2B5EF4-FFF2-40B4-BE49-F238E27FC236}">
@@ -16221,7 +16046,7 @@
           <a:p>
             <a:fld id="{14F1411D-0280-154F-AEAC-4C20B7AA46B2}" type="slidenum">
               <a:rPr lang="nl-NL" smtClean="0"/>
-              <a:t>41</a:t>
+              <a:t>40</a:t>
             </a:fld>
             <a:endParaRPr lang="nl-NL"/>
           </a:p>
@@ -16298,7 +16123,7 @@
 </p:sld>
 </file>
 
-<file path=ppt/slides/slide42.xml><?xml version="1.0" encoding="utf-8"?>
+<file path=ppt/slides/slide41.xml><?xml version="1.0" encoding="utf-8"?>
 <p:sld xmlns:a="http://schemas.openxmlformats.org/drawingml/2006/main" xmlns:r="http://schemas.openxmlformats.org/officeDocument/2006/relationships" xmlns:p="http://schemas.openxmlformats.org/presentationml/2006/main">
   <p:cSld>
     <p:spTree>
@@ -16486,7 +16311,7 @@
           <a:p>
             <a:fld id="{14F1411D-0280-154F-AEAC-4C20B7AA46B2}" type="slidenum">
               <a:rPr lang="nl-NL" smtClean="0"/>
-              <a:t>42</a:t>
+              <a:t>41</a:t>
             </a:fld>
             <a:endParaRPr lang="nl-NL"/>
           </a:p>
@@ -16636,6 +16461,243 @@
 </p:sld>
 </file>
 
+<file path=ppt/slides/slide42.xml><?xml version="1.0" encoding="utf-8"?>
+<p:sld xmlns:a="http://schemas.openxmlformats.org/drawingml/2006/main" xmlns:r="http://schemas.openxmlformats.org/officeDocument/2006/relationships" xmlns:p="http://schemas.openxmlformats.org/presentationml/2006/main">
+  <p:cSld>
+    <p:spTree>
+      <p:nvGrpSpPr>
+        <p:cNvPr id="1" name=""/>
+        <p:cNvGrpSpPr/>
+        <p:nvPr/>
+      </p:nvGrpSpPr>
+      <p:grpSpPr>
+        <a:xfrm>
+          <a:off x="0" y="0"/>
+          <a:ext cx="0" cy="0"/>
+          <a:chOff x="0" y="0"/>
+          <a:chExt cx="0" cy="0"/>
+        </a:xfrm>
+      </p:grpSpPr>
+      <p:sp>
+        <p:nvSpPr>
+          <p:cNvPr id="2" name="Title 1"/>
+          <p:cNvSpPr>
+            <a:spLocks noGrp="1"/>
+          </p:cNvSpPr>
+          <p:nvPr>
+            <p:ph type="title"/>
+          </p:nvPr>
+        </p:nvSpPr>
+        <p:spPr/>
+        <p:txBody>
+          <a:bodyPr/>
+          <a:lstStyle/>
+          <a:p>
+            <a:r>
+              <a:rPr lang="nl-NL" dirty="0"/>
+              <a:t>Hands-on (19:00 -20:00)</a:t>
+            </a:r>
+          </a:p>
+        </p:txBody>
+      </p:sp>
+      <p:sp>
+        <p:nvSpPr>
+          <p:cNvPr id="3" name="Content Placeholder 2"/>
+          <p:cNvSpPr>
+            <a:spLocks noGrp="1"/>
+          </p:cNvSpPr>
+          <p:nvPr>
+            <p:ph idx="1"/>
+          </p:nvPr>
+        </p:nvSpPr>
+        <p:spPr/>
+        <p:txBody>
+          <a:bodyPr/>
+          <a:lstStyle/>
+          <a:p>
+            <a:r>
+              <a:rPr lang="nl-NL" dirty="0">
+                <a:hlinkClick r:id="rId2">
+                  <a:extLst>
+                    <a:ext uri="{A12FA001-AC4F-418D-AE19-62706E023703}">
+                      <ahyp:hlinkClr xmlns:ahyp="http://schemas.microsoft.com/office/drawing/2018/hyperlinkcolor" val="tx"/>
+                    </a:ext>
+                  </a:extLst>
+                </a:hlinkClick>
+              </a:rPr>
+              <a:t>https://github.com/AMIS-Services/sig-elasticsearch-may2020</a:t>
+            </a:r>
+            <a:endParaRPr lang="nl-NL" dirty="0"/>
+          </a:p>
+          <a:p>
+            <a:endParaRPr lang="nl-NL" dirty="0"/>
+          </a:p>
+          <a:p>
+            <a:r>
+              <a:rPr lang="nl-NL" dirty="0"/>
+              <a:t>Running elasticsearch in docker</a:t>
+            </a:r>
+          </a:p>
+          <a:p>
+            <a:r>
+              <a:rPr lang="nl-NL" dirty="0"/>
+              <a:t>Use of recipes data from </a:t>
+            </a:r>
+            <a:r>
+              <a:rPr lang="nl-NL" dirty="0">
+                <a:hlinkClick r:id="rId3">
+                  <a:extLst>
+                    <a:ext uri="{A12FA001-AC4F-418D-AE19-62706E023703}">
+                      <ahyp:hlinkClr xmlns:ahyp="http://schemas.microsoft.com/office/drawing/2018/hyperlinkcolor" val="tx"/>
+                    </a:ext>
+                  </a:extLst>
+                </a:hlinkClick>
+              </a:rPr>
+              <a:t>https://openrecip.es/</a:t>
+            </a:r>
+            <a:endParaRPr lang="nl-NL" dirty="0"/>
+          </a:p>
+          <a:p>
+            <a:endParaRPr lang="nl-NL" dirty="0"/>
+          </a:p>
+          <a:p>
+            <a:r>
+              <a:rPr lang="nl-NL" dirty="0"/>
+              <a:t>Topics:</a:t>
+            </a:r>
+          </a:p>
+          <a:p>
+            <a:pPr lvl="1"/>
+            <a:r>
+              <a:rPr lang="en-US" sz="1400" dirty="0"/>
+              <a:t>Cluster info and Indexing</a:t>
+            </a:r>
+          </a:p>
+          <a:p>
+            <a:pPr lvl="1"/>
+            <a:r>
+              <a:rPr lang="en-US" sz="1400" dirty="0"/>
+              <a:t>Queries and aggregations</a:t>
+            </a:r>
+          </a:p>
+          <a:p>
+            <a:pPr lvl="1"/>
+            <a:r>
+              <a:rPr lang="en-US" sz="1400" dirty="0"/>
+              <a:t>Connecting to </a:t>
+            </a:r>
+            <a:r>
+              <a:rPr lang="en-US" sz="1400" dirty="0" err="1"/>
+              <a:t>ElasticSearch</a:t>
+            </a:r>
+            <a:r>
+              <a:rPr lang="en-US" sz="1400" dirty="0"/>
+              <a:t> with Node.js</a:t>
+            </a:r>
+          </a:p>
+          <a:p>
+            <a:pPr lvl="1"/>
+            <a:r>
+              <a:rPr lang="en-US" sz="1400" dirty="0"/>
+              <a:t>Connecting to </a:t>
+            </a:r>
+            <a:r>
+              <a:rPr lang="en-US" sz="1400" dirty="0" err="1"/>
+              <a:t>ElasticSearch</a:t>
+            </a:r>
+            <a:r>
+              <a:rPr lang="en-US" sz="1400" dirty="0"/>
+              <a:t> with spring</a:t>
+            </a:r>
+          </a:p>
+          <a:p>
+            <a:endParaRPr lang="nl-NL" dirty="0"/>
+          </a:p>
+        </p:txBody>
+      </p:sp>
+      <p:sp>
+        <p:nvSpPr>
+          <p:cNvPr id="4" name="Footer Placeholder 3"/>
+          <p:cNvSpPr>
+            <a:spLocks noGrp="1"/>
+          </p:cNvSpPr>
+          <p:nvPr>
+            <p:ph type="ftr" sz="quarter" idx="11"/>
+          </p:nvPr>
+        </p:nvSpPr>
+        <p:spPr/>
+        <p:txBody>
+          <a:bodyPr/>
+          <a:lstStyle/>
+          <a:p>
+            <a:r>
+              <a:rPr lang="nl-NL"/>
+              <a:t>elasticsearch</a:t>
+            </a:r>
+          </a:p>
+        </p:txBody>
+      </p:sp>
+      <p:sp>
+        <p:nvSpPr>
+          <p:cNvPr id="5" name="Slide Number Placeholder 4"/>
+          <p:cNvSpPr>
+            <a:spLocks noGrp="1"/>
+          </p:cNvSpPr>
+          <p:nvPr>
+            <p:ph type="sldNum" sz="quarter" idx="12"/>
+          </p:nvPr>
+        </p:nvSpPr>
+        <p:spPr/>
+        <p:txBody>
+          <a:bodyPr/>
+          <a:lstStyle/>
+          <a:p>
+            <a:fld id="{14F1411D-0280-154F-AEAC-4C20B7AA46B2}" type="slidenum">
+              <a:rPr lang="nl-NL" smtClean="0"/>
+              <a:t>42</a:t>
+            </a:fld>
+            <a:endParaRPr lang="nl-NL"/>
+          </a:p>
+        </p:txBody>
+      </p:sp>
+      <p:pic>
+        <p:nvPicPr>
+          <p:cNvPr id="9" name="Picture Placeholder 8"/>
+          <p:cNvPicPr>
+            <a:picLocks noGrp="1" noChangeAspect="1"/>
+          </p:cNvPicPr>
+          <p:nvPr>
+            <p:ph type="pic" idx="13"/>
+          </p:nvPr>
+        </p:nvPicPr>
+        <p:blipFill>
+          <a:blip r:embed="rId4">
+            <a:extLst>
+              <a:ext uri="{28A0092B-C50C-407E-A947-70E740481C1C}">
+                <a14:useLocalDpi xmlns:a14="http://schemas.microsoft.com/office/drawing/2010/main" val="0"/>
+              </a:ext>
+            </a:extLst>
+          </a:blip>
+          <a:srcRect t="1" b="1"/>
+          <a:stretch>
+            <a:fillRect/>
+          </a:stretch>
+        </p:blipFill>
+        <p:spPr/>
+      </p:pic>
+    </p:spTree>
+    <p:extLst>
+      <p:ext uri="{BB962C8B-B14F-4D97-AF65-F5344CB8AC3E}">
+        <p14:creationId xmlns:p14="http://schemas.microsoft.com/office/powerpoint/2010/main" val="235565209"/>
+      </p:ext>
+    </p:extLst>
+  </p:cSld>
+  <p:clrMapOvr>
+    <a:masterClrMapping/>
+  </p:clrMapOvr>
+</p:sld>
+</file>
+
 <file path=ppt/slides/slide43.xml><?xml version="1.0" encoding="utf-8"?>
 <p:sld xmlns:a="http://schemas.openxmlformats.org/drawingml/2006/main" xmlns:r="http://schemas.openxmlformats.org/officeDocument/2006/relationships" xmlns:p="http://schemas.openxmlformats.org/presentationml/2006/main">
   <p:cSld>
@@ -16655,138 +16717,7 @@
       </p:grpSpPr>
       <p:sp>
         <p:nvSpPr>
-          <p:cNvPr id="2" name="Title 1"/>
-          <p:cNvSpPr>
-            <a:spLocks noGrp="1"/>
-          </p:cNvSpPr>
-          <p:nvPr>
-            <p:ph type="title"/>
-          </p:nvPr>
-        </p:nvSpPr>
-        <p:spPr/>
-        <p:txBody>
-          <a:bodyPr/>
-          <a:lstStyle/>
-          <a:p>
-            <a:r>
-              <a:rPr lang="nl-NL" dirty="0"/>
-              <a:t>Hands-on</a:t>
-            </a:r>
-          </a:p>
-        </p:txBody>
-      </p:sp>
-      <p:sp>
-        <p:nvSpPr>
-          <p:cNvPr id="3" name="Content Placeholder 2"/>
-          <p:cNvSpPr>
-            <a:spLocks noGrp="1"/>
-          </p:cNvSpPr>
-          <p:nvPr>
-            <p:ph idx="1"/>
-          </p:nvPr>
-        </p:nvSpPr>
-        <p:spPr/>
-        <p:txBody>
-          <a:bodyPr/>
-          <a:lstStyle/>
-          <a:p>
-            <a:r>
-              <a:rPr lang="nl-NL" dirty="0">
-                <a:hlinkClick r:id="rId2">
-                  <a:extLst>
-                    <a:ext uri="{A12FA001-AC4F-418D-AE19-62706E023703}">
-                      <ahyp:hlinkClr xmlns:ahyp="http://schemas.microsoft.com/office/drawing/2018/hyperlinkcolor" val="tx"/>
-                    </a:ext>
-                  </a:extLst>
-                </a:hlinkClick>
-              </a:rPr>
-              <a:t>https://github.com/AMIS-Services/sig-elasticsearch-may2020</a:t>
-            </a:r>
-            <a:endParaRPr lang="nl-NL" dirty="0"/>
-          </a:p>
-          <a:p>
-            <a:endParaRPr lang="nl-NL" dirty="0"/>
-          </a:p>
-          <a:p>
-            <a:r>
-              <a:rPr lang="nl-NL" dirty="0"/>
-              <a:t>Running elasticsearch in docker</a:t>
-            </a:r>
-          </a:p>
-          <a:p>
-            <a:r>
-              <a:rPr lang="nl-NL" dirty="0"/>
-              <a:t>Use of recipes data from </a:t>
-            </a:r>
-            <a:r>
-              <a:rPr lang="nl-NL" dirty="0">
-                <a:hlinkClick r:id="rId3">
-                  <a:extLst>
-                    <a:ext uri="{A12FA001-AC4F-418D-AE19-62706E023703}">
-                      <ahyp:hlinkClr xmlns:ahyp="http://schemas.microsoft.com/office/drawing/2018/hyperlinkcolor" val="tx"/>
-                    </a:ext>
-                  </a:extLst>
-                </a:hlinkClick>
-              </a:rPr>
-              <a:t>https://openrecip.es/</a:t>
-            </a:r>
-            <a:endParaRPr lang="nl-NL" dirty="0"/>
-          </a:p>
-          <a:p>
-            <a:endParaRPr lang="nl-NL" dirty="0"/>
-          </a:p>
-          <a:p>
-            <a:r>
-              <a:rPr lang="nl-NL" dirty="0"/>
-              <a:t>Topics:</a:t>
-            </a:r>
-          </a:p>
-          <a:p>
-            <a:pPr lvl="1"/>
-            <a:r>
-              <a:rPr lang="en-US" sz="1400" dirty="0"/>
-              <a:t>Cluster info and Indexing</a:t>
-            </a:r>
-          </a:p>
-          <a:p>
-            <a:pPr lvl="1"/>
-            <a:r>
-              <a:rPr lang="en-US" sz="1400" dirty="0"/>
-              <a:t>Queries and aggregations</a:t>
-            </a:r>
-          </a:p>
-          <a:p>
-            <a:pPr lvl="1"/>
-            <a:r>
-              <a:rPr lang="en-US" sz="1400" dirty="0"/>
-              <a:t>Connecting Node.js to </a:t>
-            </a:r>
-            <a:r>
-              <a:rPr lang="en-US" sz="1400" dirty="0" err="1"/>
-              <a:t>ElasticSearch</a:t>
-            </a:r>
-            <a:endParaRPr lang="en-US" sz="1400" dirty="0"/>
-          </a:p>
-          <a:p>
-            <a:pPr lvl="1"/>
-            <a:r>
-              <a:rPr lang="en-US" sz="1400" dirty="0"/>
-              <a:t>Connecting Spring to </a:t>
-            </a:r>
-            <a:r>
-              <a:rPr lang="en-US" sz="1400" dirty="0" err="1"/>
-              <a:t>ElasticSearch</a:t>
-            </a:r>
-            <a:endParaRPr lang="en-US" sz="1400" dirty="0"/>
-          </a:p>
-          <a:p>
-            <a:endParaRPr lang="nl-NL" dirty="0"/>
-          </a:p>
-        </p:txBody>
-      </p:sp>
-      <p:sp>
-        <p:nvSpPr>
-          <p:cNvPr id="4" name="Footer Placeholder 3"/>
+          <p:cNvPr id="2" name="Footer Placeholder 1"/>
           <p:cNvSpPr>
             <a:spLocks noGrp="1"/>
           </p:cNvSpPr>
@@ -16808,7 +16739,7 @@
       </p:sp>
       <p:sp>
         <p:nvSpPr>
-          <p:cNvPr id="5" name="Slide Number Placeholder 4"/>
+          <p:cNvPr id="3" name="Slide Number Placeholder 2"/>
           <p:cNvSpPr>
             <a:spLocks noGrp="1"/>
           </p:cNvSpPr>
@@ -16824,106 +16755,6 @@
             <a:fld id="{14F1411D-0280-154F-AEAC-4C20B7AA46B2}" type="slidenum">
               <a:rPr lang="nl-NL" smtClean="0"/>
               <a:t>43</a:t>
-            </a:fld>
-            <a:endParaRPr lang="nl-NL"/>
-          </a:p>
-        </p:txBody>
-      </p:sp>
-      <p:pic>
-        <p:nvPicPr>
-          <p:cNvPr id="9" name="Picture Placeholder 8"/>
-          <p:cNvPicPr>
-            <a:picLocks noGrp="1" noChangeAspect="1"/>
-          </p:cNvPicPr>
-          <p:nvPr>
-            <p:ph type="pic" idx="13"/>
-          </p:nvPr>
-        </p:nvPicPr>
-        <p:blipFill>
-          <a:blip r:embed="rId4">
-            <a:extLst>
-              <a:ext uri="{28A0092B-C50C-407E-A947-70E740481C1C}">
-                <a14:useLocalDpi xmlns:a14="http://schemas.microsoft.com/office/drawing/2010/main" val="0"/>
-              </a:ext>
-            </a:extLst>
-          </a:blip>
-          <a:srcRect t="1" b="1"/>
-          <a:stretch>
-            <a:fillRect/>
-          </a:stretch>
-        </p:blipFill>
-        <p:spPr/>
-      </p:pic>
-    </p:spTree>
-    <p:extLst>
-      <p:ext uri="{BB962C8B-B14F-4D97-AF65-F5344CB8AC3E}">
-        <p14:creationId xmlns:p14="http://schemas.microsoft.com/office/powerpoint/2010/main" val="235565209"/>
-      </p:ext>
-    </p:extLst>
-  </p:cSld>
-  <p:clrMapOvr>
-    <a:masterClrMapping/>
-  </p:clrMapOvr>
-</p:sld>
-</file>
-
-<file path=ppt/slides/slide44.xml><?xml version="1.0" encoding="utf-8"?>
-<p:sld xmlns:a="http://schemas.openxmlformats.org/drawingml/2006/main" xmlns:r="http://schemas.openxmlformats.org/officeDocument/2006/relationships" xmlns:p="http://schemas.openxmlformats.org/presentationml/2006/main">
-  <p:cSld>
-    <p:spTree>
-      <p:nvGrpSpPr>
-        <p:cNvPr id="1" name=""/>
-        <p:cNvGrpSpPr/>
-        <p:nvPr/>
-      </p:nvGrpSpPr>
-      <p:grpSpPr>
-        <a:xfrm>
-          <a:off x="0" y="0"/>
-          <a:ext cx="0" cy="0"/>
-          <a:chOff x="0" y="0"/>
-          <a:chExt cx="0" cy="0"/>
-        </a:xfrm>
-      </p:grpSpPr>
-      <p:sp>
-        <p:nvSpPr>
-          <p:cNvPr id="2" name="Footer Placeholder 1"/>
-          <p:cNvSpPr>
-            <a:spLocks noGrp="1"/>
-          </p:cNvSpPr>
-          <p:nvPr>
-            <p:ph type="ftr" sz="quarter" idx="11"/>
-          </p:nvPr>
-        </p:nvSpPr>
-        <p:spPr/>
-        <p:txBody>
-          <a:bodyPr/>
-          <a:lstStyle/>
-          <a:p>
-            <a:r>
-              <a:rPr lang="nl-NL"/>
-              <a:t>elasticsearch</a:t>
-            </a:r>
-          </a:p>
-        </p:txBody>
-      </p:sp>
-      <p:sp>
-        <p:nvSpPr>
-          <p:cNvPr id="3" name="Slide Number Placeholder 2"/>
-          <p:cNvSpPr>
-            <a:spLocks noGrp="1"/>
-          </p:cNvSpPr>
-          <p:nvPr>
-            <p:ph type="sldNum" sz="quarter" idx="12"/>
-          </p:nvPr>
-        </p:nvSpPr>
-        <p:spPr/>
-        <p:txBody>
-          <a:bodyPr/>
-          <a:lstStyle/>
-          <a:p>
-            <a:fld id="{14F1411D-0280-154F-AEAC-4C20B7AA46B2}" type="slidenum">
-              <a:rPr lang="nl-NL" smtClean="0"/>
-              <a:t>44</a:t>
             </a:fld>
             <a:endParaRPr lang="nl-NL"/>
           </a:p>
@@ -18454,12 +18285,6 @@
 </file>
 
 <file path=customXml/item1.xml><?xml version="1.0" encoding="utf-8"?>
-<p:properties xmlns:p="http://schemas.microsoft.com/office/2006/metadata/properties" xmlns:xsi="http://www.w3.org/2001/XMLSchema-instance" xmlns:pc="http://schemas.microsoft.com/office/infopath/2007/PartnerControls">
-  <documentManagement/>
-</p:properties>
-</file>
-
-<file path=customXml/item2.xml><?xml version="1.0" encoding="utf-8"?>
 <ct:contentTypeSchema xmlns:ct="http://schemas.microsoft.com/office/2006/metadata/contentType" xmlns:ma="http://schemas.microsoft.com/office/2006/metadata/properties/metaAttributes" ct:_="" ma:_="" ma:contentTypeName="Document" ma:contentTypeID="0x01010054F6992C941BD0469027D6180034181D" ma:contentTypeVersion="13" ma:contentTypeDescription="Een nieuw document maken." ma:contentTypeScope="" ma:versionID="90bbe2ba6e20fa9a3c78a3adef113cb8">
   <xsd:schema xmlns:xsd="http://www.w3.org/2001/XMLSchema" xmlns:xs="http://www.w3.org/2001/XMLSchema" xmlns:p="http://schemas.microsoft.com/office/2006/metadata/properties" xmlns:ns3="e3854e12-2785-48a6-904c-b41db34ae470" xmlns:ns4="56443775-6c4e-443f-ae5b-8e5d5d05d0db" targetNamespace="http://schemas.microsoft.com/office/2006/metadata/properties" ma:root="true" ma:fieldsID="1a5ce54b376895e28555adf421d9bc35" ns3:_="" ns4:_="">
     <xsd:import namespace="e3854e12-2785-48a6-904c-b41db34ae470"/>
@@ -18682,6 +18507,12 @@
 </ct:contentTypeSchema>
 </file>
 
+<file path=customXml/item2.xml><?xml version="1.0" encoding="utf-8"?>
+<p:properties xmlns:p="http://schemas.microsoft.com/office/2006/metadata/properties" xmlns:xsi="http://www.w3.org/2001/XMLSchema-instance" xmlns:pc="http://schemas.microsoft.com/office/infopath/2007/PartnerControls">
+  <documentManagement/>
+</p:properties>
+</file>
+
 <file path=customXml/item3.xml><?xml version="1.0" encoding="utf-8"?>
 <?mso-contentType ?>
 <FormTemplates xmlns="http://schemas.microsoft.com/sharepoint/v3/contenttype/forms">
@@ -18692,23 +18523,6 @@
 </file>
 
 <file path=customXml/itemProps1.xml><?xml version="1.0" encoding="utf-8"?>
-<ds:datastoreItem xmlns:ds="http://schemas.openxmlformats.org/officeDocument/2006/customXml" ds:itemID="{63653586-D9AD-4A7C-AE25-8F164514A81A}">
-  <ds:schemaRefs>
-    <ds:schemaRef ds:uri="http://purl.org/dc/terms/"/>
-    <ds:schemaRef ds:uri="http://schemas.openxmlformats.org/package/2006/metadata/core-properties"/>
-    <ds:schemaRef ds:uri="http://schemas.microsoft.com/office/2006/documentManagement/types"/>
-    <ds:schemaRef ds:uri="http://schemas.microsoft.com/office/infopath/2007/PartnerControls"/>
-    <ds:schemaRef ds:uri="http://purl.org/dc/elements/1.1/"/>
-    <ds:schemaRef ds:uri="http://schemas.microsoft.com/office/2006/metadata/properties"/>
-    <ds:schemaRef ds:uri="56443775-6c4e-443f-ae5b-8e5d5d05d0db"/>
-    <ds:schemaRef ds:uri="e3854e12-2785-48a6-904c-b41db34ae470"/>
-    <ds:schemaRef ds:uri="http://www.w3.org/XML/1998/namespace"/>
-    <ds:schemaRef ds:uri="http://purl.org/dc/dcmitype/"/>
-  </ds:schemaRefs>
-</ds:datastoreItem>
-</file>
-
-<file path=customXml/itemProps2.xml><?xml version="1.0" encoding="utf-8"?>
 <ds:datastoreItem xmlns:ds="http://schemas.openxmlformats.org/officeDocument/2006/customXml" ds:itemID="{2236F168-07DF-4DEE-9141-9703A5EDABA9}">
   <ds:schemaRefs>
     <ds:schemaRef ds:uri="http://schemas.microsoft.com/office/2006/metadata/contentType"/>
@@ -18727,6 +18541,23 @@
 </ds:datastoreItem>
 </file>
 
+<file path=customXml/itemProps2.xml><?xml version="1.0" encoding="utf-8"?>
+<ds:datastoreItem xmlns:ds="http://schemas.openxmlformats.org/officeDocument/2006/customXml" ds:itemID="{63653586-D9AD-4A7C-AE25-8F164514A81A}">
+  <ds:schemaRefs>
+    <ds:schemaRef ds:uri="http://purl.org/dc/terms/"/>
+    <ds:schemaRef ds:uri="http://schemas.openxmlformats.org/package/2006/metadata/core-properties"/>
+    <ds:schemaRef ds:uri="http://schemas.microsoft.com/office/2006/documentManagement/types"/>
+    <ds:schemaRef ds:uri="http://schemas.microsoft.com/office/infopath/2007/PartnerControls"/>
+    <ds:schemaRef ds:uri="http://purl.org/dc/elements/1.1/"/>
+    <ds:schemaRef ds:uri="http://schemas.microsoft.com/office/2006/metadata/properties"/>
+    <ds:schemaRef ds:uri="56443775-6c4e-443f-ae5b-8e5d5d05d0db"/>
+    <ds:schemaRef ds:uri="e3854e12-2785-48a6-904c-b41db34ae470"/>
+    <ds:schemaRef ds:uri="http://www.w3.org/XML/1998/namespace"/>
+    <ds:schemaRef ds:uri="http://purl.org/dc/dcmitype/"/>
+  </ds:schemaRefs>
+</ds:datastoreItem>
+</file>
+
 <file path=customXml/itemProps3.xml><?xml version="1.0" encoding="utf-8"?>
 <ds:datastoreItem xmlns:ds="http://schemas.openxmlformats.org/officeDocument/2006/customXml" ds:itemID="{15DF2822-16E4-4479-B239-41A079CBB65B}">
   <ds:schemaRefs>

</xml_diff>